<commit_message>
adjustment of profit formula
</commit_message>
<xml_diff>
--- a/illustration_slides.pptx
+++ b/illustration_slides.pptx
@@ -4698,7 +4698,7 @@
           <a:p>
             <a:fld id="{846CE7D5-CF57-46EF-B807-FDD0502418D4}" type="datetimeFigureOut">
               <a:rPr lang="en-GB" smtClean="0"/>
-              <a:t>31/08/2023</a:t>
+              <a:t>16/09/2023</a:t>
             </a:fld>
             <a:endParaRPr lang="en-GB"/>
           </a:p>
@@ -4994,7 +4994,7 @@
           <a:p>
             <a:fld id="{846CE7D5-CF57-46EF-B807-FDD0502418D4}" type="datetimeFigureOut">
               <a:rPr lang="en-GB" smtClean="0"/>
-              <a:t>31/08/2023</a:t>
+              <a:t>16/09/2023</a:t>
             </a:fld>
             <a:endParaRPr lang="en-GB"/>
           </a:p>
@@ -5242,7 +5242,7 @@
           <a:p>
             <a:fld id="{846CE7D5-CF57-46EF-B807-FDD0502418D4}" type="datetimeFigureOut">
               <a:rPr lang="en-GB" smtClean="0"/>
-              <a:t>31/08/2023</a:t>
+              <a:t>16/09/2023</a:t>
             </a:fld>
             <a:endParaRPr lang="en-GB"/>
           </a:p>
@@ -5782,7 +5782,7 @@
           <a:p>
             <a:fld id="{846CE7D5-CF57-46EF-B807-FDD0502418D4}" type="datetimeFigureOut">
               <a:rPr lang="en-GB" smtClean="0"/>
-              <a:t>31/08/2023</a:t>
+              <a:t>16/09/2023</a:t>
             </a:fld>
             <a:endParaRPr lang="en-GB"/>
           </a:p>
@@ -6030,7 +6030,7 @@
           <a:p>
             <a:fld id="{846CE7D5-CF57-46EF-B807-FDD0502418D4}" type="datetimeFigureOut">
               <a:rPr lang="en-GB" smtClean="0"/>
-              <a:t>31/08/2023</a:t>
+              <a:t>16/09/2023</a:t>
             </a:fld>
             <a:endParaRPr lang="en-GB"/>
           </a:p>
@@ -6562,7 +6562,7 @@
           <a:p>
             <a:fld id="{846CE7D5-CF57-46EF-B807-FDD0502418D4}" type="datetimeFigureOut">
               <a:rPr lang="en-GB" smtClean="0"/>
-              <a:t>31/08/2023</a:t>
+              <a:t>16/09/2023</a:t>
             </a:fld>
             <a:endParaRPr lang="en-GB"/>
           </a:p>
@@ -6859,7 +6859,7 @@
           <a:p>
             <a:fld id="{846CE7D5-CF57-46EF-B807-FDD0502418D4}" type="datetimeFigureOut">
               <a:rPr lang="en-GB" smtClean="0"/>
-              <a:t>31/08/2023</a:t>
+              <a:t>16/09/2023</a:t>
             </a:fld>
             <a:endParaRPr lang="en-GB"/>
           </a:p>
@@ -7033,7 +7033,7 @@
           <a:p>
             <a:fld id="{846CE7D5-CF57-46EF-B807-FDD0502418D4}" type="datetimeFigureOut">
               <a:rPr lang="en-GB" smtClean="0"/>
-              <a:t>31/08/2023</a:t>
+              <a:t>16/09/2023</a:t>
             </a:fld>
             <a:endParaRPr lang="en-GB"/>
           </a:p>
@@ -7213,7 +7213,7 @@
           <a:p>
             <a:fld id="{846CE7D5-CF57-46EF-B807-FDD0502418D4}" type="datetimeFigureOut">
               <a:rPr lang="en-GB" smtClean="0"/>
-              <a:t>31/08/2023</a:t>
+              <a:t>16/09/2023</a:t>
             </a:fld>
             <a:endParaRPr lang="en-GB"/>
           </a:p>
@@ -7383,7 +7383,7 @@
           <a:p>
             <a:fld id="{846CE7D5-CF57-46EF-B807-FDD0502418D4}" type="datetimeFigureOut">
               <a:rPr lang="en-GB" smtClean="0"/>
-              <a:t>31/08/2023</a:t>
+              <a:t>16/09/2023</a:t>
             </a:fld>
             <a:endParaRPr lang="en-GB"/>
           </a:p>
@@ -7634,7 +7634,7 @@
           <a:p>
             <a:fld id="{846CE7D5-CF57-46EF-B807-FDD0502418D4}" type="datetimeFigureOut">
               <a:rPr lang="en-GB" smtClean="0"/>
-              <a:t>31/08/2023</a:t>
+              <a:t>16/09/2023</a:t>
             </a:fld>
             <a:endParaRPr lang="en-GB"/>
           </a:p>
@@ -7931,7 +7931,7 @@
           <a:p>
             <a:fld id="{846CE7D5-CF57-46EF-B807-FDD0502418D4}" type="datetimeFigureOut">
               <a:rPr lang="en-GB" smtClean="0"/>
-              <a:t>31/08/2023</a:t>
+              <a:t>16/09/2023</a:t>
             </a:fld>
             <a:endParaRPr lang="en-GB"/>
           </a:p>
@@ -8373,7 +8373,7 @@
           <a:p>
             <a:fld id="{846CE7D5-CF57-46EF-B807-FDD0502418D4}" type="datetimeFigureOut">
               <a:rPr lang="en-GB" smtClean="0"/>
-              <a:t>31/08/2023</a:t>
+              <a:t>16/09/2023</a:t>
             </a:fld>
             <a:endParaRPr lang="en-GB"/>
           </a:p>
@@ -8491,7 +8491,7 @@
           <a:p>
             <a:fld id="{846CE7D5-CF57-46EF-B807-FDD0502418D4}" type="datetimeFigureOut">
               <a:rPr lang="en-GB" smtClean="0"/>
-              <a:t>31/08/2023</a:t>
+              <a:t>16/09/2023</a:t>
             </a:fld>
             <a:endParaRPr lang="en-GB"/>
           </a:p>
@@ -8586,7 +8586,7 @@
           <a:p>
             <a:fld id="{846CE7D5-CF57-46EF-B807-FDD0502418D4}" type="datetimeFigureOut">
               <a:rPr lang="en-GB" smtClean="0"/>
-              <a:t>31/08/2023</a:t>
+              <a:t>16/09/2023</a:t>
             </a:fld>
             <a:endParaRPr lang="en-GB"/>
           </a:p>
@@ -8869,7 +8869,7 @@
           <a:p>
             <a:fld id="{846CE7D5-CF57-46EF-B807-FDD0502418D4}" type="datetimeFigureOut">
               <a:rPr lang="en-GB" smtClean="0"/>
-              <a:t>31/08/2023</a:t>
+              <a:t>16/09/2023</a:t>
             </a:fld>
             <a:endParaRPr lang="en-GB"/>
           </a:p>
@@ -9160,7 +9160,7 @@
           <a:p>
             <a:fld id="{846CE7D5-CF57-46EF-B807-FDD0502418D4}" type="datetimeFigureOut">
               <a:rPr lang="en-GB" smtClean="0"/>
-              <a:t>31/08/2023</a:t>
+              <a:t>16/09/2023</a:t>
             </a:fld>
             <a:endParaRPr lang="en-GB"/>
           </a:p>
@@ -9690,7 +9690,7 @@
           <a:p>
             <a:fld id="{846CE7D5-CF57-46EF-B807-FDD0502418D4}" type="datetimeFigureOut">
               <a:rPr lang="en-GB" smtClean="0"/>
-              <a:t>31/08/2023</a:t>
+              <a:t>16/09/2023</a:t>
             </a:fld>
             <a:endParaRPr lang="en-GB"/>
           </a:p>
@@ -20249,8 +20249,8 @@
           <a:chExt cx="0" cy="0"/>
         </a:xfrm>
       </p:grpSpPr>
-      <mc:AlternateContent xmlns:mc="http://schemas.openxmlformats.org/markup-compatibility/2006" xmlns:a14="http://schemas.microsoft.com/office/drawing/2010/main">
-        <mc:Choice Requires="a14">
+      <mc:AlternateContent xmlns:mc="http://schemas.openxmlformats.org/markup-compatibility/2006">
+        <mc:Choice xmlns:a14="http://schemas.microsoft.com/office/drawing/2010/main" Requires="a14">
           <p:sp>
             <p:nvSpPr>
               <p:cNvPr id="2" name="Title 1">
@@ -20287,7 +20287,7 @@
                     </m:oMathParaPr>
                     <m:oMath xmlns:m="http://schemas.openxmlformats.org/officeDocument/2006/math">
                       <m:r>
-                        <a:rPr lang="en-SG" sz="2800" b="0" i="1" smtClean="0">
+                        <a:rPr lang="en-SG" sz="2200" b="0" i="1" smtClean="0">
                           <a:latin typeface="Cambria Math" panose="02040503050406030204" pitchFamily="18" charset="0"/>
                         </a:rPr>
                         <m:t>𝑃𝑟𝑜𝑓𝑖</m:t>
@@ -20295,14 +20295,14 @@
                       <m:sSub>
                         <m:sSubPr>
                           <m:ctrlPr>
-                            <a:rPr lang="en-SG" sz="2800" b="0" i="1" smtClean="0">
+                            <a:rPr lang="en-SG" sz="2200" b="0" i="1" smtClean="0">
                               <a:latin typeface="Cambria Math" panose="02040503050406030204" pitchFamily="18" charset="0"/>
                             </a:rPr>
                           </m:ctrlPr>
                         </m:sSubPr>
                         <m:e>
                           <m:r>
-                            <a:rPr lang="en-SG" sz="2800" b="0" i="1" smtClean="0">
+                            <a:rPr lang="en-SG" sz="2200" b="0" i="1" smtClean="0">
                               <a:latin typeface="Cambria Math" panose="02040503050406030204" pitchFamily="18" charset="0"/>
                             </a:rPr>
                             <m:t>𝑡</m:t>
@@ -20310,7 +20310,7 @@
                         </m:e>
                         <m:sub>
                           <m:r>
-                            <a:rPr lang="en-SG" sz="2800" b="0" i="1" smtClean="0">
+                            <a:rPr lang="en-SG" sz="2200" b="0" i="1" smtClean="0">
                               <a:latin typeface="Cambria Math" panose="02040503050406030204" pitchFamily="18" charset="0"/>
                             </a:rPr>
                             <m:t>𝑖</m:t>
@@ -20318,76 +20318,163 @@
                         </m:sub>
                       </m:sSub>
                       <m:r>
-                        <a:rPr lang="en-GB" sz="2800" i="1">
+                        <a:rPr lang="en-GB" sz="2200" i="1">
                           <a:latin typeface="Cambria Math" panose="02040503050406030204" pitchFamily="18" charset="0"/>
                         </a:rPr>
-                        <m:t>=−</m:t>
+                        <m:t>=</m:t>
+                      </m:r>
+                      <m:sSub>
+                        <m:sSubPr>
+                          <m:ctrlPr>
+                            <a:rPr lang="en-SG" sz="2200" i="1"/>
+                          </m:ctrlPr>
+                        </m:sSubPr>
+                        <m:e>
+                          <m:r>
+                            <a:rPr lang="en-GB" sz="2200" i="1"/>
+                            <m:t>𝑠</m:t>
+                          </m:r>
+                        </m:e>
+                        <m:sub>
+                          <m:r>
+                            <a:rPr lang="en-GB" sz="2200" i="1"/>
+                            <m:t>𝑖</m:t>
+                          </m:r>
+                          <m:r>
+                            <a:rPr lang="en-GB" sz="2200" i="1"/>
+                            <m:t>,</m:t>
+                          </m:r>
+                          <m:r>
+                            <a:rPr lang="en-GB" sz="2200" i="1"/>
+                            <m:t>𝐷</m:t>
+                          </m:r>
+                        </m:sub>
+                      </m:sSub>
+                      <m:sSub>
+                        <m:sSubPr>
+                          <m:ctrlPr>
+                            <a:rPr lang="en-SG" sz="2200" i="1"/>
+                          </m:ctrlPr>
+                        </m:sSubPr>
+                        <m:e>
+                          <m:r>
+                            <a:rPr lang="en-GB" sz="2200" i="1"/>
+                            <m:t>𝑀</m:t>
+                          </m:r>
+                        </m:e>
+                        <m:sub>
+                          <m:r>
+                            <a:rPr lang="en-GB" sz="2200" i="1"/>
+                            <m:t>𝑖</m:t>
+                          </m:r>
+                          <m:r>
+                            <a:rPr lang="en-GB" sz="2200" i="1"/>
+                            <m:t>,</m:t>
+                          </m:r>
+                          <m:r>
+                            <a:rPr lang="en-GB" sz="2200" i="1"/>
+                            <m:t>𝐷</m:t>
+                          </m:r>
+                        </m:sub>
+                      </m:sSub>
+                      <m:r>
+                        <a:rPr lang="en-GB" sz="2200" i="1"/>
+                        <m:t>−</m:t>
                       </m:r>
                       <m:nary>
                         <m:naryPr>
                           <m:chr m:val="∑"/>
                           <m:supHide m:val="on"/>
                           <m:ctrlPr>
-                            <a:rPr lang="en-SG" sz="2800" i="1">
-                              <a:latin typeface="Cambria Math" panose="02040503050406030204" pitchFamily="18" charset="0"/>
-                            </a:rPr>
+                            <a:rPr lang="en-SG" sz="2200" i="1"/>
                           </m:ctrlPr>
                         </m:naryPr>
                         <m:sub>
                           <m:r>
-                            <a:rPr lang="en-GB" sz="2800" i="1">
-                              <a:latin typeface="Cambria Math" panose="02040503050406030204" pitchFamily="18" charset="0"/>
-                            </a:rPr>
+                            <a:rPr lang="en-GB" sz="2200" i="1"/>
                             <m:t>𝑎𝑙𝑙</m:t>
                           </m:r>
                           <m:r>
-                            <a:rPr lang="en-GB" sz="2800" i="1">
-                              <a:latin typeface="Cambria Math" panose="02040503050406030204" pitchFamily="18" charset="0"/>
-                            </a:rPr>
+                            <a:rPr lang="en-GB" sz="2200" i="1"/>
                             <m:t> </m:t>
                           </m:r>
                           <m:r>
-                            <a:rPr lang="en-GB" sz="2800" i="1">
-                              <a:latin typeface="Cambria Math" panose="02040503050406030204" pitchFamily="18" charset="0"/>
-                            </a:rPr>
+                            <a:rPr lang="en-GB" sz="2200" i="1"/>
                             <m:t>𝑛</m:t>
                           </m:r>
+                          <m:r>
+                            <a:rPr lang="en-GB" sz="2200" i="1"/>
+                            <m:t> </m:t>
+                          </m:r>
+                          <m:r>
+                            <a:rPr lang="en-GB" sz="2200" i="1"/>
+                            <m:t>𝜖</m:t>
+                          </m:r>
+                          <m:d>
+                            <m:dPr>
+                              <m:begChr m:val="["/>
+                              <m:endChr m:val="]"/>
+                              <m:ctrlPr>
+                                <a:rPr lang="en-SG" sz="2200" i="1"/>
+                              </m:ctrlPr>
+                            </m:dPr>
+                            <m:e>
+                              <m:r>
+                                <a:rPr lang="en-GB" sz="2200" i="1"/>
+                                <m:t>𝐸</m:t>
+                              </m:r>
+                              <m:r>
+                                <a:rPr lang="en-GB" sz="2200" i="1"/>
+                                <m:t>,</m:t>
+                              </m:r>
+                              <m:r>
+                                <a:rPr lang="en-GB" sz="2200" i="1"/>
+                                <m:t>𝑃</m:t>
+                              </m:r>
+                              <m:r>
+                                <a:rPr lang="en-GB" sz="2200" i="1"/>
+                                <m:t>,</m:t>
+                              </m:r>
+                              <m:r>
+                                <a:rPr lang="en-GB" sz="2200" i="1"/>
+                                <m:t>𝑀</m:t>
+                              </m:r>
+                              <m:r>
+                                <a:rPr lang="en-GB" sz="2200" i="1"/>
+                                <m:t>,</m:t>
+                              </m:r>
+                              <m:r>
+                                <a:rPr lang="en-GB" sz="2200" i="1"/>
+                                <m:t>𝐴</m:t>
+                              </m:r>
+                            </m:e>
+                          </m:d>
                         </m:sub>
                         <m:sup/>
                         <m:e>
                           <m:sSub>
                             <m:sSubPr>
                               <m:ctrlPr>
-                                <a:rPr lang="en-SG" sz="2800" i="1">
-                                  <a:latin typeface="Cambria Math" panose="02040503050406030204" pitchFamily="18" charset="0"/>
-                                </a:rPr>
+                                <a:rPr lang="en-SG" sz="2200" i="1"/>
                               </m:ctrlPr>
                             </m:sSubPr>
                             <m:e>
                               <m:r>
-                                <a:rPr lang="en-GB" sz="2800" i="1">
-                                  <a:latin typeface="Cambria Math" panose="02040503050406030204" pitchFamily="18" charset="0"/>
-                                </a:rPr>
+                                <a:rPr lang="en-GB" sz="2200" i="1"/>
                                 <m:t>𝑐</m:t>
                               </m:r>
                             </m:e>
                             <m:sub>
                               <m:r>
-                                <a:rPr lang="en-GB" sz="2800" i="1">
-                                  <a:latin typeface="Cambria Math" panose="02040503050406030204" pitchFamily="18" charset="0"/>
-                                </a:rPr>
+                                <a:rPr lang="en-GB" sz="2200" i="1"/>
                                 <m:t>𝑖</m:t>
                               </m:r>
                               <m:r>
-                                <a:rPr lang="en-GB" sz="2800" i="1">
-                                  <a:latin typeface="Cambria Math" panose="02040503050406030204" pitchFamily="18" charset="0"/>
-                                </a:rPr>
+                                <a:rPr lang="en-GB" sz="2200" i="1"/>
                                 <m:t>,</m:t>
                               </m:r>
                               <m:r>
-                                <a:rPr lang="en-GB" sz="2800" i="1">
-                                  <a:latin typeface="Cambria Math" panose="02040503050406030204" pitchFamily="18" charset="0"/>
-                                </a:rPr>
+                                <a:rPr lang="en-GB" sz="2200" i="1"/>
                                 <m:t>𝑛</m:t>
                               </m:r>
                             </m:sub>
@@ -20395,36 +20482,26 @@
                           <m:sSub>
                             <m:sSubPr>
                               <m:ctrlPr>
-                                <a:rPr lang="en-SG" sz="2800" i="1">
-                                  <a:latin typeface="Cambria Math" panose="02040503050406030204" pitchFamily="18" charset="0"/>
-                                </a:rPr>
+                                <a:rPr lang="en-SG" sz="2200" i="1"/>
                               </m:ctrlPr>
                             </m:sSubPr>
                             <m:e>
                               <m:r>
-                                <a:rPr lang="en-GB" sz="2800" i="1">
-                                  <a:latin typeface="Cambria Math" panose="02040503050406030204" pitchFamily="18" charset="0"/>
-                                </a:rPr>
+                                <a:rPr lang="en-GB" sz="2200" i="1"/>
                                 <m:t>𝑀</m:t>
                               </m:r>
                             </m:e>
                             <m:sub>
                               <m:r>
-                                <a:rPr lang="en-GB" sz="2800" i="1">
-                                  <a:latin typeface="Cambria Math" panose="02040503050406030204" pitchFamily="18" charset="0"/>
-                                </a:rPr>
+                                <a:rPr lang="en-GB" sz="2200" i="1"/>
                                 <m:t>𝑖</m:t>
                               </m:r>
                               <m:r>
-                                <a:rPr lang="en-GB" sz="2800" i="1">
-                                  <a:latin typeface="Cambria Math" panose="02040503050406030204" pitchFamily="18" charset="0"/>
-                                </a:rPr>
+                                <a:rPr lang="en-GB" sz="2200" i="1"/>
                                 <m:t>,</m:t>
                               </m:r>
                               <m:r>
-                                <a:rPr lang="en-GB" sz="2800" i="1">
-                                  <a:latin typeface="Cambria Math" panose="02040503050406030204" pitchFamily="18" charset="0"/>
-                                </a:rPr>
+                                <a:rPr lang="en-GB" sz="2200" i="1"/>
                                 <m:t>𝑛</m:t>
                               </m:r>
                             </m:sub>
@@ -20432,7 +20509,7 @@
                         </m:e>
                       </m:nary>
                       <m:r>
-                        <a:rPr lang="en-GB" sz="2800" i="1">
+                        <a:rPr lang="en-GB" sz="2200" i="1">
                           <a:latin typeface="Cambria Math" panose="02040503050406030204" pitchFamily="18" charset="0"/>
                         </a:rPr>
                         <m:t>+</m:t>
@@ -20442,26 +20519,26 @@
                           <m:chr m:val="∑"/>
                           <m:supHide m:val="on"/>
                           <m:ctrlPr>
-                            <a:rPr lang="en-SG" sz="2800" i="1">
+                            <a:rPr lang="en-SG" sz="2200" i="1">
                               <a:latin typeface="Cambria Math" panose="02040503050406030204" pitchFamily="18" charset="0"/>
                             </a:rPr>
                           </m:ctrlPr>
                         </m:naryPr>
                         <m:sub>
                           <m:r>
-                            <a:rPr lang="en-GB" sz="2800" i="1">
+                            <a:rPr lang="en-GB" sz="2200" i="1">
                               <a:latin typeface="Cambria Math" panose="02040503050406030204" pitchFamily="18" charset="0"/>
                             </a:rPr>
                             <m:t>𝑎𝑙𝑙</m:t>
                           </m:r>
                           <m:r>
-                            <a:rPr lang="en-GB" sz="2800" i="1">
+                            <a:rPr lang="en-GB" sz="2200" i="1">
                               <a:latin typeface="Cambria Math" panose="02040503050406030204" pitchFamily="18" charset="0"/>
                             </a:rPr>
                             <m:t> </m:t>
                           </m:r>
                           <m:r>
-                            <a:rPr lang="en-GB" sz="2800" i="1">
+                            <a:rPr lang="en-GB" sz="2200" i="1">
                               <a:latin typeface="Cambria Math" panose="02040503050406030204" pitchFamily="18" charset="0"/>
                             </a:rPr>
                             <m:t>𝑒</m:t>
@@ -20472,14 +20549,14 @@
                           <m:sSub>
                             <m:sSubPr>
                               <m:ctrlPr>
-                                <a:rPr lang="en-SG" sz="2800" i="1">
+                                <a:rPr lang="en-SG" sz="2200" i="1">
                                   <a:latin typeface="Cambria Math" panose="02040503050406030204" pitchFamily="18" charset="0"/>
                                 </a:rPr>
                               </m:ctrlPr>
                             </m:sSubPr>
                             <m:e>
                               <m:r>
-                                <a:rPr lang="en-GB" sz="2800" i="1">
+                                <a:rPr lang="en-GB" sz="2200" i="1">
                                   <a:latin typeface="Cambria Math" panose="02040503050406030204" pitchFamily="18" charset="0"/>
                                 </a:rPr>
                                 <m:t>𝑟</m:t>
@@ -20487,31 +20564,31 @@
                             </m:e>
                             <m:sub>
                               <m:r>
-                                <a:rPr lang="en-GB" sz="2800" i="1">
+                                <a:rPr lang="en-GB" sz="2200" i="1">
                                   <a:latin typeface="Cambria Math" panose="02040503050406030204" pitchFamily="18" charset="0"/>
                                 </a:rPr>
                                 <m:t>𝑜𝑢𝑡</m:t>
                               </m:r>
                               <m:r>
-                                <a:rPr lang="en-GB" sz="2800" i="1">
+                                <a:rPr lang="en-GB" sz="2200" i="1">
                                   <a:latin typeface="Cambria Math" panose="02040503050406030204" pitchFamily="18" charset="0"/>
                                 </a:rPr>
                                 <m:t>,</m:t>
                               </m:r>
                               <m:r>
-                                <a:rPr lang="en-GB" sz="2800" i="1">
+                                <a:rPr lang="en-GB" sz="2200" i="1">
                                   <a:latin typeface="Cambria Math" panose="02040503050406030204" pitchFamily="18" charset="0"/>
                                 </a:rPr>
                                 <m:t>𝑖</m:t>
                               </m:r>
                               <m:r>
-                                <a:rPr lang="en-GB" sz="2800" i="1">
+                                <a:rPr lang="en-GB" sz="2200" i="1">
                                   <a:latin typeface="Cambria Math" panose="02040503050406030204" pitchFamily="18" charset="0"/>
                                 </a:rPr>
                                 <m:t>,</m:t>
                               </m:r>
                               <m:r>
-                                <a:rPr lang="en-GB" sz="2800" i="1">
+                                <a:rPr lang="en-GB" sz="2200" i="1">
                                   <a:latin typeface="Cambria Math" panose="02040503050406030204" pitchFamily="18" charset="0"/>
                                 </a:rPr>
                                 <m:t>𝑒</m:t>
@@ -20521,14 +20598,14 @@
                           <m:sSub>
                             <m:sSubPr>
                               <m:ctrlPr>
-                                <a:rPr lang="en-SG" sz="2800" i="1">
+                                <a:rPr lang="en-SG" sz="2200" i="1">
                                   <a:latin typeface="Cambria Math" panose="02040503050406030204" pitchFamily="18" charset="0"/>
                                 </a:rPr>
                               </m:ctrlPr>
                             </m:sSubPr>
                             <m:e>
                               <m:r>
-                                <a:rPr lang="en-GB" sz="2800" i="1">
+                                <a:rPr lang="en-GB" sz="2200" i="1">
                                   <a:latin typeface="Cambria Math" panose="02040503050406030204" pitchFamily="18" charset="0"/>
                                 </a:rPr>
                                 <m:t>𝑇</m:t>
@@ -20536,31 +20613,31 @@
                             </m:e>
                             <m:sub>
                               <m:r>
-                                <a:rPr lang="en-GB" sz="2800" i="1">
+                                <a:rPr lang="en-GB" sz="2200" i="1">
                                   <a:latin typeface="Cambria Math" panose="02040503050406030204" pitchFamily="18" charset="0"/>
                                 </a:rPr>
                                 <m:t>𝑜𝑢𝑡</m:t>
                               </m:r>
                               <m:r>
-                                <a:rPr lang="en-GB" sz="2800" i="1">
+                                <a:rPr lang="en-GB" sz="2200" i="1">
                                   <a:latin typeface="Cambria Math" panose="02040503050406030204" pitchFamily="18" charset="0"/>
                                 </a:rPr>
                                 <m:t>,</m:t>
                               </m:r>
                               <m:r>
-                                <a:rPr lang="en-GB" sz="2800" i="1">
+                                <a:rPr lang="en-GB" sz="2200" i="1">
                                   <a:latin typeface="Cambria Math" panose="02040503050406030204" pitchFamily="18" charset="0"/>
                                 </a:rPr>
                                 <m:t>𝑖</m:t>
                               </m:r>
                               <m:r>
-                                <a:rPr lang="en-GB" sz="2800" i="1">
+                                <a:rPr lang="en-GB" sz="2200" i="1">
                                   <a:latin typeface="Cambria Math" panose="02040503050406030204" pitchFamily="18" charset="0"/>
                                 </a:rPr>
                                 <m:t>,</m:t>
                               </m:r>
                               <m:r>
-                                <a:rPr lang="en-GB" sz="2800" i="1">
+                                <a:rPr lang="en-GB" sz="2200" i="1">
                                   <a:latin typeface="Cambria Math" panose="02040503050406030204" pitchFamily="18" charset="0"/>
                                 </a:rPr>
                                 <m:t>𝑒</m:t>
@@ -20570,7 +20647,7 @@
                         </m:e>
                       </m:nary>
                       <m:r>
-                        <a:rPr lang="en-GB" sz="2800" i="1">
+                        <a:rPr lang="en-GB" sz="2200" i="1">
                           <a:latin typeface="Cambria Math" panose="02040503050406030204" pitchFamily="18" charset="0"/>
                         </a:rPr>
                         <m:t>−</m:t>
@@ -20580,26 +20657,26 @@
                           <m:chr m:val="∑"/>
                           <m:supHide m:val="on"/>
                           <m:ctrlPr>
-                            <a:rPr lang="en-SG" sz="2800" i="1">
+                            <a:rPr lang="en-SG" sz="2200" i="1">
                               <a:latin typeface="Cambria Math" panose="02040503050406030204" pitchFamily="18" charset="0"/>
                             </a:rPr>
                           </m:ctrlPr>
                         </m:naryPr>
                         <m:sub>
                           <m:r>
-                            <a:rPr lang="en-GB" sz="2800" i="1">
+                            <a:rPr lang="en-GB" sz="2200" i="1">
                               <a:latin typeface="Cambria Math" panose="02040503050406030204" pitchFamily="18" charset="0"/>
                             </a:rPr>
                             <m:t>𝑎𝑙𝑙</m:t>
                           </m:r>
                           <m:r>
-                            <a:rPr lang="en-GB" sz="2800" i="1">
+                            <a:rPr lang="en-GB" sz="2200" i="1">
                               <a:latin typeface="Cambria Math" panose="02040503050406030204" pitchFamily="18" charset="0"/>
                             </a:rPr>
                             <m:t> </m:t>
                           </m:r>
                           <m:r>
-                            <a:rPr lang="en-GB" sz="2800" i="1">
+                            <a:rPr lang="en-GB" sz="2200" i="1">
                               <a:latin typeface="Cambria Math" panose="02040503050406030204" pitchFamily="18" charset="0"/>
                             </a:rPr>
                             <m:t>𝑗</m:t>
@@ -20610,14 +20687,14 @@
                           <m:sSub>
                             <m:sSubPr>
                               <m:ctrlPr>
-                                <a:rPr lang="en-SG" sz="2800" i="1">
+                                <a:rPr lang="en-SG" sz="2200" i="1">
                                   <a:latin typeface="Cambria Math" panose="02040503050406030204" pitchFamily="18" charset="0"/>
                                 </a:rPr>
                               </m:ctrlPr>
                             </m:sSubPr>
                             <m:e>
                               <m:r>
-                                <a:rPr lang="en-GB" sz="2800" i="1">
+                                <a:rPr lang="en-GB" sz="2200" i="1">
                                   <a:latin typeface="Cambria Math" panose="02040503050406030204" pitchFamily="18" charset="0"/>
                                 </a:rPr>
                                 <m:t>𝑟</m:t>
@@ -20625,31 +20702,31 @@
                             </m:e>
                             <m:sub>
                               <m:r>
-                                <a:rPr lang="en-GB" sz="2800" i="1">
+                                <a:rPr lang="en-GB" sz="2200" i="1">
                                   <a:latin typeface="Cambria Math" panose="02040503050406030204" pitchFamily="18" charset="0"/>
                                 </a:rPr>
                                 <m:t>𝑖𝑛</m:t>
                               </m:r>
                               <m:r>
-                                <a:rPr lang="en-GB" sz="2800" i="1">
+                                <a:rPr lang="en-GB" sz="2200" i="1">
                                   <a:latin typeface="Cambria Math" panose="02040503050406030204" pitchFamily="18" charset="0"/>
                                 </a:rPr>
                                 <m:t>,</m:t>
                               </m:r>
                               <m:r>
-                                <a:rPr lang="en-GB" sz="2800" i="1">
+                                <a:rPr lang="en-GB" sz="2200" i="1">
                                   <a:latin typeface="Cambria Math" panose="02040503050406030204" pitchFamily="18" charset="0"/>
                                 </a:rPr>
                                 <m:t>𝑑</m:t>
                               </m:r>
                               <m:r>
-                                <a:rPr lang="en-GB" sz="2800" i="1">
+                                <a:rPr lang="en-GB" sz="2200" i="1">
                                   <a:latin typeface="Cambria Math" panose="02040503050406030204" pitchFamily="18" charset="0"/>
                                 </a:rPr>
                                 <m:t>,</m:t>
                               </m:r>
                               <m:r>
-                                <a:rPr lang="en-GB" sz="2800" i="1">
+                                <a:rPr lang="en-GB" sz="2200" i="1">
                                   <a:latin typeface="Cambria Math" panose="02040503050406030204" pitchFamily="18" charset="0"/>
                                 </a:rPr>
                                 <m:t>𝑗</m:t>
@@ -20659,14 +20736,14 @@
                           <m:sSub>
                             <m:sSubPr>
                               <m:ctrlPr>
-                                <a:rPr lang="en-SG" sz="2800" i="1">
+                                <a:rPr lang="en-SG" sz="2200" i="1">
                                   <a:latin typeface="Cambria Math" panose="02040503050406030204" pitchFamily="18" charset="0"/>
                                 </a:rPr>
                               </m:ctrlPr>
                             </m:sSubPr>
                             <m:e>
                               <m:r>
-                                <a:rPr lang="en-GB" sz="2800" i="1">
+                                <a:rPr lang="en-GB" sz="2200" i="1">
                                   <a:latin typeface="Cambria Math" panose="02040503050406030204" pitchFamily="18" charset="0"/>
                                 </a:rPr>
                                 <m:t>𝑇</m:t>
@@ -20674,31 +20751,31 @@
                             </m:e>
                             <m:sub>
                               <m:r>
-                                <a:rPr lang="en-GB" sz="2800" i="1">
+                                <a:rPr lang="en-GB" sz="2200" i="1">
                                   <a:latin typeface="Cambria Math" panose="02040503050406030204" pitchFamily="18" charset="0"/>
                                 </a:rPr>
                                 <m:t>𝑖𝑛</m:t>
                               </m:r>
                               <m:r>
-                                <a:rPr lang="en-GB" sz="2800" i="1">
+                                <a:rPr lang="en-GB" sz="2200" i="1">
                                   <a:latin typeface="Cambria Math" panose="02040503050406030204" pitchFamily="18" charset="0"/>
                                 </a:rPr>
                                 <m:t>,</m:t>
                               </m:r>
                               <m:r>
-                                <a:rPr lang="en-GB" sz="2800" i="1">
+                                <a:rPr lang="en-GB" sz="2200" i="1">
                                   <a:latin typeface="Cambria Math" panose="02040503050406030204" pitchFamily="18" charset="0"/>
                                 </a:rPr>
                                 <m:t>𝑑</m:t>
                               </m:r>
                               <m:r>
-                                <a:rPr lang="en-GB" sz="2800" i="1">
+                                <a:rPr lang="en-GB" sz="2200" i="1">
                                   <a:latin typeface="Cambria Math" panose="02040503050406030204" pitchFamily="18" charset="0"/>
                                 </a:rPr>
                                 <m:t>,</m:t>
                               </m:r>
                               <m:r>
-                                <a:rPr lang="en-GB" sz="2800" i="1">
+                                <a:rPr lang="en-GB" sz="2200" i="1">
                                   <a:latin typeface="Cambria Math" panose="02040503050406030204" pitchFamily="18" charset="0"/>
                                 </a:rPr>
                                 <m:t>𝑗</m:t>
@@ -20711,14 +20788,14 @@
                   </m:oMathPara>
                 </a14:m>
                 <a:br>
-                  <a:rPr lang="en-SG" dirty="0"/>
+                  <a:rPr lang="en-SG" sz="2200" dirty="0"/>
                 </a:br>
-                <a:endParaRPr lang="en-SG" sz="3600" dirty="0"/>
+                <a:endParaRPr lang="en-SG" sz="2200" dirty="0"/>
               </a:p>
             </p:txBody>
           </p:sp>
         </mc:Choice>
-        <mc:Fallback xmlns="">
+        <mc:Fallback>
           <p:sp>
             <p:nvSpPr>
               <p:cNvPr id="2" name="Title 1">
@@ -20743,7 +20820,7 @@
               <a:blipFill>
                 <a:blip r:embed="rId2"/>
                 <a:stretch>
-                  <a:fillRect b="-14110"/>
+                  <a:fillRect/>
                 </a:stretch>
               </a:blipFill>
             </p:spPr>
@@ -20874,8 +20951,8 @@
           </a:p>
         </p:txBody>
       </p:sp>
-      <mc:AlternateContent xmlns:mc="http://schemas.openxmlformats.org/markup-compatibility/2006" xmlns:a14="http://schemas.microsoft.com/office/drawing/2010/main">
-        <mc:Choice Requires="a14">
+      <mc:AlternateContent xmlns:mc="http://schemas.openxmlformats.org/markup-compatibility/2006">
+        <mc:Choice xmlns:a14="http://schemas.microsoft.com/office/drawing/2010/main" Requires="a14">
           <p:sp>
             <p:nvSpPr>
               <p:cNvPr id="5" name="Text Placeholder 2">
@@ -20894,13 +20971,13 @@
             </p:nvSpPr>
             <p:spPr>
               <a:xfrm>
-                <a:off x="2075442" y="3085620"/>
-                <a:ext cx="9427580" cy="3558249"/>
+                <a:off x="1557282" y="3085620"/>
+                <a:ext cx="5301902" cy="3558249"/>
               </a:xfrm>
             </p:spPr>
             <p:txBody>
               <a:bodyPr anchor="t">
-                <a:normAutofit fontScale="77500" lnSpcReduction="20000"/>
+                <a:normAutofit fontScale="85000" lnSpcReduction="10000"/>
               </a:bodyPr>
               <a:lstStyle/>
               <a:p>
@@ -21051,7 +21128,7 @@
                     <m:sSub>
                       <m:sSubPr>
                         <m:ctrlPr>
-                          <a:rPr lang="en-SG" sz="1800" i="1">
+                          <a:rPr lang="en-SG" sz="1800" i="1" smtClean="0">
                             <a:solidFill>
                               <a:srgbClr val="000000"/>
                             </a:solidFill>
@@ -21165,12 +21242,6 @@
                   </a:rPr>
                   <a:t> for producing 1 unit product for the process n.</a:t>
                 </a:r>
-                <a:endParaRPr lang="en-SG" sz="1800" dirty="0">
-                  <a:effectLst/>
-                  <a:latin typeface="Calibri" panose="020F0502020204030204" pitchFamily="34" charset="0"/>
-                  <a:ea typeface="Calibri" panose="020F0502020204030204" pitchFamily="34" charset="0"/>
-                  <a:cs typeface="Times New Roman" panose="02020603050405020304" pitchFamily="18" charset="0"/>
-                </a:endParaRPr>
               </a:p>
               <a:p>
                 <a:pPr marL="342900" lvl="0" indent="-342900" algn="l">
@@ -21185,13 +21256,12 @@
                     <m:sSub>
                       <m:sSubPr>
                         <m:ctrlPr>
-                          <a:rPr lang="en-SG" sz="1800" i="1">
+                          <a:rPr lang="en-SG" sz="1600" i="1" smtClean="0">
                             <a:solidFill>
                               <a:srgbClr val="000000"/>
                             </a:solidFill>
                             <a:effectLst/>
                             <a:latin typeface="Cambria Math" panose="02040503050406030204" pitchFamily="18" charset="0"/>
-                            <a:ea typeface="SimSun" panose="02010600030101010101" pitchFamily="2" charset="-122"/>
                             <a:cs typeface="Calibri" panose="020F0502020204030204" pitchFamily="34" charset="0"/>
                           </a:rPr>
                         </m:ctrlPr>
@@ -21207,156 +21277,10 @@
                             <a:ea typeface="Calibri" panose="020F0502020204030204" pitchFamily="34" charset="0"/>
                             <a:cs typeface="Calibri" panose="020F0502020204030204" pitchFamily="34" charset="0"/>
                           </a:rPr>
-                          <m:t>𝑀</m:t>
+                          <m:t>𝑠</m:t>
                         </m:r>
                       </m:e>
                       <m:sub>
-                        <m:r>
-                          <a:rPr lang="en-GB" sz="1800" i="1">
-                            <a:solidFill>
-                              <a:srgbClr val="000000"/>
-                            </a:solidFill>
-                            <a:effectLst/>
-                            <a:latin typeface="Cambria Math" panose="02040503050406030204" pitchFamily="18" charset="0"/>
-                            <a:ea typeface="SimSun" panose="02010600030101010101" pitchFamily="2" charset="-122"/>
-                            <a:cs typeface="Calibri" panose="020F0502020204030204" pitchFamily="34" charset="0"/>
-                          </a:rPr>
-                          <m:t>𝑖</m:t>
-                        </m:r>
-                        <m:r>
-                          <a:rPr lang="en-GB" sz="1800" i="1">
-                            <a:solidFill>
-                              <a:srgbClr val="000000"/>
-                            </a:solidFill>
-                            <a:effectLst/>
-                            <a:latin typeface="Cambria Math" panose="02040503050406030204" pitchFamily="18" charset="0"/>
-                            <a:ea typeface="SimSun" panose="02010600030101010101" pitchFamily="2" charset="-122"/>
-                            <a:cs typeface="Calibri" panose="020F0502020204030204" pitchFamily="34" charset="0"/>
-                          </a:rPr>
-                          <m:t>,</m:t>
-                        </m:r>
-                        <m:r>
-                          <a:rPr lang="en-GB" sz="1800" i="1">
-                            <a:solidFill>
-                              <a:srgbClr val="000000"/>
-                            </a:solidFill>
-                            <a:effectLst/>
-                            <a:latin typeface="Cambria Math" panose="02040503050406030204" pitchFamily="18" charset="0"/>
-                            <a:ea typeface="SimSun" panose="02010600030101010101" pitchFamily="2" charset="-122"/>
-                            <a:cs typeface="Calibri" panose="020F0502020204030204" pitchFamily="34" charset="0"/>
-                          </a:rPr>
-                          <m:t>𝑛</m:t>
-                        </m:r>
-                      </m:sub>
-                    </m:sSub>
-                  </m:oMath>
-                </a14:m>
-                <a:r>
-                  <a:rPr lang="en-GB" sz="1800" dirty="0">
-                    <a:solidFill>
-                      <a:srgbClr val="000000"/>
-                    </a:solidFill>
-                    <a:effectLst/>
-                    <a:latin typeface="Calibri" panose="020F0502020204030204" pitchFamily="34" charset="0"/>
-                    <a:ea typeface="Calibri" panose="020F0502020204030204" pitchFamily="34" charset="0"/>
-                    <a:cs typeface="Calibri" panose="020F0502020204030204" pitchFamily="34" charset="0"/>
-                  </a:rPr>
-                  <a:t>: Total number of unit outputs produced locally in process n of the local country </a:t>
-                </a:r>
-                <a:r>
-                  <a:rPr lang="en-GB" sz="1800" dirty="0" err="1">
-                    <a:solidFill>
-                      <a:srgbClr val="000000"/>
-                    </a:solidFill>
-                    <a:effectLst/>
-                    <a:latin typeface="Calibri" panose="020F0502020204030204" pitchFamily="34" charset="0"/>
-                    <a:ea typeface="Calibri" panose="020F0502020204030204" pitchFamily="34" charset="0"/>
-                    <a:cs typeface="Calibri" panose="020F0502020204030204" pitchFamily="34" charset="0"/>
-                  </a:rPr>
-                  <a:t>i</a:t>
-                </a:r>
-                <a:r>
-                  <a:rPr lang="en-GB" sz="1800" dirty="0">
-                    <a:solidFill>
-                      <a:srgbClr val="000000"/>
-                    </a:solidFill>
-                    <a:effectLst/>
-                    <a:latin typeface="Calibri" panose="020F0502020204030204" pitchFamily="34" charset="0"/>
-                    <a:ea typeface="Calibri" panose="020F0502020204030204" pitchFamily="34" charset="0"/>
-                    <a:cs typeface="Calibri" panose="020F0502020204030204" pitchFamily="34" charset="0"/>
-                  </a:rPr>
-                  <a:t>.</a:t>
-                </a:r>
-                <a:endParaRPr lang="en-SG" sz="1800" dirty="0">
-                  <a:effectLst/>
-                  <a:latin typeface="Calibri" panose="020F0502020204030204" pitchFamily="34" charset="0"/>
-                  <a:ea typeface="Calibri" panose="020F0502020204030204" pitchFamily="34" charset="0"/>
-                  <a:cs typeface="Times New Roman" panose="02020603050405020304" pitchFamily="18" charset="0"/>
-                </a:endParaRPr>
-              </a:p>
-              <a:p>
-                <a:pPr marL="342900" lvl="0" indent="-342900" algn="l">
-                  <a:lnSpc>
-                    <a:spcPct val="107000"/>
-                  </a:lnSpc>
-                  <a:buFont typeface="Symbol" panose="05050102010706020507" pitchFamily="18" charset="2"/>
-                  <a:buChar char=""/>
-                </a:pPr>
-                <a14:m>
-                  <m:oMath xmlns:m="http://schemas.openxmlformats.org/officeDocument/2006/math">
-                    <m:sSub>
-                      <m:sSubPr>
-                        <m:ctrlPr>
-                          <a:rPr lang="en-SG" sz="1800" i="1">
-                            <a:solidFill>
-                              <a:srgbClr val="000000"/>
-                            </a:solidFill>
-                            <a:effectLst/>
-                            <a:latin typeface="Cambria Math" panose="02040503050406030204" pitchFamily="18" charset="0"/>
-                            <a:ea typeface="Calibri" panose="020F0502020204030204" pitchFamily="34" charset="0"/>
-                            <a:cs typeface="Calibri" panose="020F0502020204030204" pitchFamily="34" charset="0"/>
-                          </a:rPr>
-                        </m:ctrlPr>
-                      </m:sSubPr>
-                      <m:e>
-                        <m:r>
-                          <a:rPr lang="en-GB" sz="1800" i="1">
-                            <a:solidFill>
-                              <a:srgbClr val="000000"/>
-                            </a:solidFill>
-                            <a:effectLst/>
-                            <a:latin typeface="Cambria Math" panose="02040503050406030204" pitchFamily="18" charset="0"/>
-                            <a:ea typeface="Calibri" panose="020F0502020204030204" pitchFamily="34" charset="0"/>
-                            <a:cs typeface="Calibri" panose="020F0502020204030204" pitchFamily="34" charset="0"/>
-                          </a:rPr>
-                          <m:t>𝑇</m:t>
-                        </m:r>
-                      </m:e>
-                      <m:sub>
-                        <m:r>
-                          <a:rPr lang="en-GB" sz="1800" i="1">
-                            <a:solidFill>
-                              <a:srgbClr val="000000"/>
-                            </a:solidFill>
-                            <a:effectLst/>
-                            <a:latin typeface="Cambria Math" panose="02040503050406030204" pitchFamily="18" charset="0"/>
-                            <a:ea typeface="Calibri" panose="020F0502020204030204" pitchFamily="34" charset="0"/>
-                            <a:cs typeface="Calibri" panose="020F0502020204030204" pitchFamily="34" charset="0"/>
-                          </a:rPr>
-                          <m:t>𝑜𝑢𝑡</m:t>
-                        </m:r>
-                        <m:r>
-                          <a:rPr lang="en-GB" sz="1800" i="1">
-                            <a:solidFill>
-                              <a:srgbClr val="000000"/>
-                            </a:solidFill>
-                            <a:effectLst/>
-                            <a:latin typeface="Cambria Math" panose="02040503050406030204" pitchFamily="18" charset="0"/>
-                            <a:ea typeface="Calibri" panose="020F0502020204030204" pitchFamily="34" charset="0"/>
-                            <a:cs typeface="Calibri" panose="020F0502020204030204" pitchFamily="34" charset="0"/>
-                          </a:rPr>
-                          <m:t>,</m:t>
-                        </m:r>
                         <m:r>
                           <a:rPr lang="en-GB" sz="1800" i="1">
                             <a:solidFill>
@@ -21391,7 +21315,7 @@
                             <a:ea typeface="Calibri" panose="020F0502020204030204" pitchFamily="34" charset="0"/>
                             <a:cs typeface="Calibri" panose="020F0502020204030204" pitchFamily="34" charset="0"/>
                           </a:rPr>
-                          <m:t>𝑒</m:t>
+                          <m:t>𝐷</m:t>
                         </m:r>
                       </m:sub>
                     </m:sSub>
@@ -21405,9 +21329,8 @@
                     <a:effectLst/>
                     <a:latin typeface="Calibri" panose="020F0502020204030204" pitchFamily="34" charset="0"/>
                     <a:ea typeface="SimSun" panose="02010600030101010101" pitchFamily="2" charset="-122"/>
-                    <a:cs typeface="Calibri" panose="020F0502020204030204" pitchFamily="34" charset="0"/>
                   </a:rPr>
-                  <a:t>: Total number of units being exported by the local region </a:t>
+                  <a:t>: Sales Revenue from Distribution for selling 1 Device in region </a:t>
                 </a:r>
                 <a:r>
                   <a:rPr lang="en-GB" sz="1800" dirty="0" err="1">
@@ -21417,7 +21340,6 @@
                     <a:effectLst/>
                     <a:latin typeface="Calibri" panose="020F0502020204030204" pitchFamily="34" charset="0"/>
                     <a:ea typeface="SimSun" panose="02010600030101010101" pitchFamily="2" charset="-122"/>
-                    <a:cs typeface="Calibri" panose="020F0502020204030204" pitchFamily="34" charset="0"/>
                   </a:rPr>
                   <a:t>i</a:t>
                 </a:r>
@@ -21429,402 +21351,8 @@
                     <a:effectLst/>
                     <a:latin typeface="Calibri" panose="020F0502020204030204" pitchFamily="34" charset="0"/>
                     <a:ea typeface="SimSun" panose="02010600030101010101" pitchFamily="2" charset="-122"/>
-                    <a:cs typeface="Calibri" panose="020F0502020204030204" pitchFamily="34" charset="0"/>
                   </a:rPr>
-                  <a:t> from process e.</a:t>
-                </a:r>
-                <a:endParaRPr lang="en-SG" sz="1800" dirty="0">
-                  <a:effectLst/>
-                  <a:latin typeface="Calibri" panose="020F0502020204030204" pitchFamily="34" charset="0"/>
-                  <a:ea typeface="Calibri" panose="020F0502020204030204" pitchFamily="34" charset="0"/>
-                  <a:cs typeface="Times New Roman" panose="02020603050405020304" pitchFamily="18" charset="0"/>
-                </a:endParaRPr>
-              </a:p>
-              <a:p>
-                <a:pPr marL="342900" lvl="0" indent="-342900" algn="l">
-                  <a:lnSpc>
-                    <a:spcPct val="107000"/>
-                  </a:lnSpc>
-                  <a:buFont typeface="Symbol" panose="05050102010706020507" pitchFamily="18" charset="2"/>
-                  <a:buChar char=""/>
-                </a:pPr>
-                <a14:m>
-                  <m:oMath xmlns:m="http://schemas.openxmlformats.org/officeDocument/2006/math">
-                    <m:sSub>
-                      <m:sSubPr>
-                        <m:ctrlPr>
-                          <a:rPr lang="en-SG" sz="1800" i="1">
-                            <a:solidFill>
-                              <a:srgbClr val="000000"/>
-                            </a:solidFill>
-                            <a:effectLst/>
-                            <a:latin typeface="Cambria Math" panose="02040503050406030204" pitchFamily="18" charset="0"/>
-                            <a:ea typeface="Calibri" panose="020F0502020204030204" pitchFamily="34" charset="0"/>
-                            <a:cs typeface="Calibri" panose="020F0502020204030204" pitchFamily="34" charset="0"/>
-                          </a:rPr>
-                        </m:ctrlPr>
-                      </m:sSubPr>
-                      <m:e>
-                        <m:r>
-                          <a:rPr lang="en-GB" sz="1800" i="1">
-                            <a:solidFill>
-                              <a:srgbClr val="000000"/>
-                            </a:solidFill>
-                            <a:effectLst/>
-                            <a:latin typeface="Cambria Math" panose="02040503050406030204" pitchFamily="18" charset="0"/>
-                            <a:ea typeface="Calibri" panose="020F0502020204030204" pitchFamily="34" charset="0"/>
-                            <a:cs typeface="Calibri" panose="020F0502020204030204" pitchFamily="34" charset="0"/>
-                          </a:rPr>
-                          <m:t>𝑇</m:t>
-                        </m:r>
-                      </m:e>
-                      <m:sub>
-                        <m:r>
-                          <a:rPr lang="en-GB" sz="1800" i="1">
-                            <a:solidFill>
-                              <a:srgbClr val="000000"/>
-                            </a:solidFill>
-                            <a:effectLst/>
-                            <a:latin typeface="Cambria Math" panose="02040503050406030204" pitchFamily="18" charset="0"/>
-                            <a:ea typeface="Calibri" panose="020F0502020204030204" pitchFamily="34" charset="0"/>
-                            <a:cs typeface="Calibri" panose="020F0502020204030204" pitchFamily="34" charset="0"/>
-                          </a:rPr>
-                          <m:t>𝑖𝑛</m:t>
-                        </m:r>
-                        <m:r>
-                          <a:rPr lang="en-GB" sz="1800" i="1">
-                            <a:solidFill>
-                              <a:srgbClr val="000000"/>
-                            </a:solidFill>
-                            <a:effectLst/>
-                            <a:latin typeface="Cambria Math" panose="02040503050406030204" pitchFamily="18" charset="0"/>
-                            <a:ea typeface="Calibri" panose="020F0502020204030204" pitchFamily="34" charset="0"/>
-                            <a:cs typeface="Calibri" panose="020F0502020204030204" pitchFamily="34" charset="0"/>
-                          </a:rPr>
-                          <m:t>,</m:t>
-                        </m:r>
-                        <m:r>
-                          <a:rPr lang="en-GB" sz="1800" i="1">
-                            <a:solidFill>
-                              <a:srgbClr val="000000"/>
-                            </a:solidFill>
-                            <a:effectLst/>
-                            <a:latin typeface="Cambria Math" panose="02040503050406030204" pitchFamily="18" charset="0"/>
-                            <a:ea typeface="Calibri" panose="020F0502020204030204" pitchFamily="34" charset="0"/>
-                            <a:cs typeface="Calibri" panose="020F0502020204030204" pitchFamily="34" charset="0"/>
-                          </a:rPr>
-                          <m:t>𝑑</m:t>
-                        </m:r>
-                        <m:r>
-                          <a:rPr lang="en-GB" sz="1800" i="1">
-                            <a:solidFill>
-                              <a:srgbClr val="000000"/>
-                            </a:solidFill>
-                            <a:effectLst/>
-                            <a:latin typeface="Cambria Math" panose="02040503050406030204" pitchFamily="18" charset="0"/>
-                            <a:ea typeface="Calibri" panose="020F0502020204030204" pitchFamily="34" charset="0"/>
-                            <a:cs typeface="Calibri" panose="020F0502020204030204" pitchFamily="34" charset="0"/>
-                          </a:rPr>
-                          <m:t>,</m:t>
-                        </m:r>
-                        <m:r>
-                          <a:rPr lang="en-GB" sz="1800" i="1">
-                            <a:solidFill>
-                              <a:srgbClr val="000000"/>
-                            </a:solidFill>
-                            <a:effectLst/>
-                            <a:latin typeface="Cambria Math" panose="02040503050406030204" pitchFamily="18" charset="0"/>
-                            <a:ea typeface="Calibri" panose="020F0502020204030204" pitchFamily="34" charset="0"/>
-                            <a:cs typeface="Calibri" panose="020F0502020204030204" pitchFamily="34" charset="0"/>
-                          </a:rPr>
-                          <m:t>𝑗</m:t>
-                        </m:r>
-                      </m:sub>
-                    </m:sSub>
-                  </m:oMath>
-                </a14:m>
-                <a:r>
-                  <a:rPr lang="en-GB" sz="1800" dirty="0">
-                    <a:solidFill>
-                      <a:srgbClr val="000000"/>
-                    </a:solidFill>
-                    <a:effectLst/>
-                    <a:latin typeface="Calibri" panose="020F0502020204030204" pitchFamily="34" charset="0"/>
-                    <a:ea typeface="SimSun" panose="02010600030101010101" pitchFamily="2" charset="-122"/>
-                    <a:cs typeface="Calibri" panose="020F0502020204030204" pitchFamily="34" charset="0"/>
-                  </a:rPr>
-                  <a:t>: Total number of units being imported from another region d from process j</a:t>
-                </a:r>
-                <a:endParaRPr lang="en-SG" sz="1800" dirty="0">
-                  <a:effectLst/>
-                  <a:latin typeface="Calibri" panose="020F0502020204030204" pitchFamily="34" charset="0"/>
-                  <a:ea typeface="Calibri" panose="020F0502020204030204" pitchFamily="34" charset="0"/>
-                  <a:cs typeface="Times New Roman" panose="02020603050405020304" pitchFamily="18" charset="0"/>
-                </a:endParaRPr>
-              </a:p>
-              <a:p>
-                <a:pPr marL="342900" lvl="0" indent="-342900" algn="l">
-                  <a:lnSpc>
-                    <a:spcPct val="107000"/>
-                  </a:lnSpc>
-                  <a:buFont typeface="Symbol" panose="05050102010706020507" pitchFamily="18" charset="2"/>
-                  <a:buChar char=""/>
-                </a:pPr>
-                <a14:m>
-                  <m:oMath xmlns:m="http://schemas.openxmlformats.org/officeDocument/2006/math">
-                    <m:sSub>
-                      <m:sSubPr>
-                        <m:ctrlPr>
-                          <a:rPr lang="en-SG" sz="1800" i="1">
-                            <a:solidFill>
-                              <a:srgbClr val="000000"/>
-                            </a:solidFill>
-                            <a:effectLst/>
-                            <a:latin typeface="Cambria Math" panose="02040503050406030204" pitchFamily="18" charset="0"/>
-                            <a:ea typeface="Calibri" panose="020F0502020204030204" pitchFamily="34" charset="0"/>
-                            <a:cs typeface="Calibri" panose="020F0502020204030204" pitchFamily="34" charset="0"/>
-                          </a:rPr>
-                        </m:ctrlPr>
-                      </m:sSubPr>
-                      <m:e>
-                        <m:r>
-                          <a:rPr lang="en-GB" sz="1800" i="1">
-                            <a:solidFill>
-                              <a:srgbClr val="000000"/>
-                            </a:solidFill>
-                            <a:effectLst/>
-                            <a:latin typeface="Cambria Math" panose="02040503050406030204" pitchFamily="18" charset="0"/>
-                            <a:ea typeface="Calibri" panose="020F0502020204030204" pitchFamily="34" charset="0"/>
-                            <a:cs typeface="Calibri" panose="020F0502020204030204" pitchFamily="34" charset="0"/>
-                          </a:rPr>
-                          <m:t>𝑟</m:t>
-                        </m:r>
-                      </m:e>
-                      <m:sub>
-                        <m:r>
-                          <a:rPr lang="en-GB" sz="1800" i="1">
-                            <a:solidFill>
-                              <a:srgbClr val="000000"/>
-                            </a:solidFill>
-                            <a:effectLst/>
-                            <a:latin typeface="Cambria Math" panose="02040503050406030204" pitchFamily="18" charset="0"/>
-                            <a:ea typeface="Calibri" panose="020F0502020204030204" pitchFamily="34" charset="0"/>
-                            <a:cs typeface="Calibri" panose="020F0502020204030204" pitchFamily="34" charset="0"/>
-                          </a:rPr>
-                          <m:t>𝑜𝑢𝑡</m:t>
-                        </m:r>
-                        <m:r>
-                          <a:rPr lang="en-GB" sz="1800" i="1">
-                            <a:solidFill>
-                              <a:srgbClr val="000000"/>
-                            </a:solidFill>
-                            <a:effectLst/>
-                            <a:latin typeface="Cambria Math" panose="02040503050406030204" pitchFamily="18" charset="0"/>
-                            <a:ea typeface="Calibri" panose="020F0502020204030204" pitchFamily="34" charset="0"/>
-                            <a:cs typeface="Calibri" panose="020F0502020204030204" pitchFamily="34" charset="0"/>
-                          </a:rPr>
-                          <m:t>,</m:t>
-                        </m:r>
-                        <m:r>
-                          <a:rPr lang="en-GB" sz="1800" i="1">
-                            <a:solidFill>
-                              <a:srgbClr val="000000"/>
-                            </a:solidFill>
-                            <a:effectLst/>
-                            <a:latin typeface="Cambria Math" panose="02040503050406030204" pitchFamily="18" charset="0"/>
-                            <a:ea typeface="Calibri" panose="020F0502020204030204" pitchFamily="34" charset="0"/>
-                            <a:cs typeface="Calibri" panose="020F0502020204030204" pitchFamily="34" charset="0"/>
-                          </a:rPr>
-                          <m:t>𝑖</m:t>
-                        </m:r>
-                        <m:r>
-                          <a:rPr lang="en-GB" sz="1800" i="1">
-                            <a:solidFill>
-                              <a:srgbClr val="000000"/>
-                            </a:solidFill>
-                            <a:effectLst/>
-                            <a:latin typeface="Cambria Math" panose="02040503050406030204" pitchFamily="18" charset="0"/>
-                            <a:ea typeface="Calibri" panose="020F0502020204030204" pitchFamily="34" charset="0"/>
-                            <a:cs typeface="Calibri" panose="020F0502020204030204" pitchFamily="34" charset="0"/>
-                          </a:rPr>
-                          <m:t>,</m:t>
-                        </m:r>
-                        <m:r>
-                          <a:rPr lang="en-GB" sz="1800" i="1">
-                            <a:solidFill>
-                              <a:srgbClr val="000000"/>
-                            </a:solidFill>
-                            <a:effectLst/>
-                            <a:latin typeface="Cambria Math" panose="02040503050406030204" pitchFamily="18" charset="0"/>
-                            <a:ea typeface="Calibri" panose="020F0502020204030204" pitchFamily="34" charset="0"/>
-                            <a:cs typeface="Calibri" panose="020F0502020204030204" pitchFamily="34" charset="0"/>
-                          </a:rPr>
-                          <m:t>𝑒</m:t>
-                        </m:r>
-                      </m:sub>
-                    </m:sSub>
-                  </m:oMath>
-                </a14:m>
-                <a:r>
-                  <a:rPr lang="en-GB" sz="1800" dirty="0">
-                    <a:solidFill>
-                      <a:srgbClr val="000000"/>
-                    </a:solidFill>
-                    <a:effectLst/>
-                    <a:latin typeface="Calibri" panose="020F0502020204030204" pitchFamily="34" charset="0"/>
-                    <a:ea typeface="Calibri" panose="020F0502020204030204" pitchFamily="34" charset="0"/>
-                    <a:cs typeface="Calibri" panose="020F0502020204030204" pitchFamily="34" charset="0"/>
-                  </a:rPr>
-                  <a:t>: Revenue for exporting a single of unit of product from process e in country </a:t>
-                </a:r>
-                <a:r>
-                  <a:rPr lang="en-GB" sz="1800" dirty="0" err="1">
-                    <a:solidFill>
-                      <a:srgbClr val="000000"/>
-                    </a:solidFill>
-                    <a:effectLst/>
-                    <a:latin typeface="Calibri" panose="020F0502020204030204" pitchFamily="34" charset="0"/>
-                    <a:ea typeface="Calibri" panose="020F0502020204030204" pitchFamily="34" charset="0"/>
-                    <a:cs typeface="Calibri" panose="020F0502020204030204" pitchFamily="34" charset="0"/>
-                  </a:rPr>
-                  <a:t>i</a:t>
-                </a:r>
-                <a:r>
-                  <a:rPr lang="en-GB" sz="1800" dirty="0">
-                    <a:solidFill>
-                      <a:srgbClr val="000000"/>
-                    </a:solidFill>
-                    <a:effectLst/>
-                    <a:latin typeface="Calibri" panose="020F0502020204030204" pitchFamily="34" charset="0"/>
-                    <a:ea typeface="Calibri" panose="020F0502020204030204" pitchFamily="34" charset="0"/>
-                    <a:cs typeface="Calibri" panose="020F0502020204030204" pitchFamily="34" charset="0"/>
-                  </a:rPr>
-                  <a:t>. </a:t>
-                </a:r>
-                <a:endParaRPr lang="en-SG" sz="1800" dirty="0">
-                  <a:effectLst/>
-                  <a:latin typeface="Calibri" panose="020F0502020204030204" pitchFamily="34" charset="0"/>
-                  <a:ea typeface="Calibri" panose="020F0502020204030204" pitchFamily="34" charset="0"/>
-                  <a:cs typeface="Times New Roman" panose="02020603050405020304" pitchFamily="18" charset="0"/>
-                </a:endParaRPr>
-              </a:p>
-              <a:p>
-                <a:pPr marL="342900" lvl="0" indent="-342900" algn="l">
-                  <a:lnSpc>
-                    <a:spcPct val="107000"/>
-                  </a:lnSpc>
-                  <a:spcAft>
-                    <a:spcPts val="800"/>
-                  </a:spcAft>
-                  <a:buFont typeface="Symbol" panose="05050102010706020507" pitchFamily="18" charset="2"/>
-                  <a:buChar char=""/>
-                </a:pPr>
-                <a14:m>
-                  <m:oMath xmlns:m="http://schemas.openxmlformats.org/officeDocument/2006/math">
-                    <m:sSub>
-                      <m:sSubPr>
-                        <m:ctrlPr>
-                          <a:rPr lang="en-SG" sz="1800" i="1">
-                            <a:solidFill>
-                              <a:srgbClr val="000000"/>
-                            </a:solidFill>
-                            <a:effectLst/>
-                            <a:latin typeface="Cambria Math" panose="02040503050406030204" pitchFamily="18" charset="0"/>
-                            <a:ea typeface="Calibri" panose="020F0502020204030204" pitchFamily="34" charset="0"/>
-                            <a:cs typeface="Calibri" panose="020F0502020204030204" pitchFamily="34" charset="0"/>
-                          </a:rPr>
-                        </m:ctrlPr>
-                      </m:sSubPr>
-                      <m:e>
-                        <m:r>
-                          <a:rPr lang="en-GB" sz="1800" i="1">
-                            <a:solidFill>
-                              <a:srgbClr val="000000"/>
-                            </a:solidFill>
-                            <a:effectLst/>
-                            <a:latin typeface="Cambria Math" panose="02040503050406030204" pitchFamily="18" charset="0"/>
-                            <a:ea typeface="Calibri" panose="020F0502020204030204" pitchFamily="34" charset="0"/>
-                            <a:cs typeface="Calibri" panose="020F0502020204030204" pitchFamily="34" charset="0"/>
-                          </a:rPr>
-                          <m:t>𝑟</m:t>
-                        </m:r>
-                      </m:e>
-                      <m:sub>
-                        <m:r>
-                          <a:rPr lang="en-GB" sz="1800" i="1">
-                            <a:solidFill>
-                              <a:srgbClr val="000000"/>
-                            </a:solidFill>
-                            <a:effectLst/>
-                            <a:latin typeface="Cambria Math" panose="02040503050406030204" pitchFamily="18" charset="0"/>
-                            <a:ea typeface="Calibri" panose="020F0502020204030204" pitchFamily="34" charset="0"/>
-                            <a:cs typeface="Calibri" panose="020F0502020204030204" pitchFamily="34" charset="0"/>
-                          </a:rPr>
-                          <m:t>𝑖𝑛</m:t>
-                        </m:r>
-                        <m:r>
-                          <a:rPr lang="en-GB" sz="1800" i="1">
-                            <a:solidFill>
-                              <a:srgbClr val="000000"/>
-                            </a:solidFill>
-                            <a:effectLst/>
-                            <a:latin typeface="Cambria Math" panose="02040503050406030204" pitchFamily="18" charset="0"/>
-                            <a:ea typeface="Calibri" panose="020F0502020204030204" pitchFamily="34" charset="0"/>
-                            <a:cs typeface="Calibri" panose="020F0502020204030204" pitchFamily="34" charset="0"/>
-                          </a:rPr>
-                          <m:t>,</m:t>
-                        </m:r>
-                        <m:r>
-                          <a:rPr lang="en-GB" sz="1800" i="1">
-                            <a:solidFill>
-                              <a:srgbClr val="000000"/>
-                            </a:solidFill>
-                            <a:effectLst/>
-                            <a:latin typeface="Cambria Math" panose="02040503050406030204" pitchFamily="18" charset="0"/>
-                            <a:ea typeface="Calibri" panose="020F0502020204030204" pitchFamily="34" charset="0"/>
-                            <a:cs typeface="Calibri" panose="020F0502020204030204" pitchFamily="34" charset="0"/>
-                          </a:rPr>
-                          <m:t>𝑑</m:t>
-                        </m:r>
-                        <m:r>
-                          <a:rPr lang="en-GB" sz="1800" i="1">
-                            <a:solidFill>
-                              <a:srgbClr val="000000"/>
-                            </a:solidFill>
-                            <a:effectLst/>
-                            <a:latin typeface="Cambria Math" panose="02040503050406030204" pitchFamily="18" charset="0"/>
-                            <a:ea typeface="Calibri" panose="020F0502020204030204" pitchFamily="34" charset="0"/>
-                            <a:cs typeface="Calibri" panose="020F0502020204030204" pitchFamily="34" charset="0"/>
-                          </a:rPr>
-                          <m:t>,</m:t>
-                        </m:r>
-                        <m:r>
-                          <a:rPr lang="en-GB" sz="1800" i="1">
-                            <a:solidFill>
-                              <a:srgbClr val="000000"/>
-                            </a:solidFill>
-                            <a:effectLst/>
-                            <a:latin typeface="Cambria Math" panose="02040503050406030204" pitchFamily="18" charset="0"/>
-                            <a:ea typeface="Calibri" panose="020F0502020204030204" pitchFamily="34" charset="0"/>
-                            <a:cs typeface="Calibri" panose="020F0502020204030204" pitchFamily="34" charset="0"/>
-                          </a:rPr>
-                          <m:t>𝑗</m:t>
-                        </m:r>
-                      </m:sub>
-                    </m:sSub>
-                  </m:oMath>
-                </a14:m>
-                <a:r>
-                  <a:rPr lang="en-GB" sz="1800" dirty="0">
-                    <a:solidFill>
-                      <a:srgbClr val="000000"/>
-                    </a:solidFill>
-                    <a:effectLst/>
-                    <a:latin typeface="Calibri" panose="020F0502020204030204" pitchFamily="34" charset="0"/>
-                    <a:ea typeface="Calibri" panose="020F0502020204030204" pitchFamily="34" charset="0"/>
-                    <a:cs typeface="Calibri" panose="020F0502020204030204" pitchFamily="34" charset="0"/>
-                  </a:rPr>
-                  <a:t>: Cost for importing a single of unit of product from process j in region d. </a:t>
+                  <a:t>.</a:t>
                 </a:r>
                 <a:endParaRPr lang="en-SG" sz="1800" dirty="0">
                   <a:effectLst/>
@@ -21843,7 +21371,7 @@
             </p:txBody>
           </p:sp>
         </mc:Choice>
-        <mc:Fallback xmlns="">
+        <mc:Fallback>
           <p:sp>
             <p:nvSpPr>
               <p:cNvPr id="5" name="Text Placeholder 2">
@@ -21862,13 +21390,13 @@
             </p:nvSpPr>
             <p:spPr>
               <a:xfrm>
-                <a:off x="2075442" y="3085620"/>
-                <a:ext cx="9427580" cy="3558249"/>
+                <a:off x="1557282" y="3085620"/>
+                <a:ext cx="5301902" cy="3558249"/>
               </a:xfrm>
               <a:blipFill>
                 <a:blip r:embed="rId3"/>
                 <a:stretch>
-                  <a:fillRect l="-711" t="-4281"/>
+                  <a:fillRect l="-1494" t="-4110"/>
                 </a:stretch>
               </a:blipFill>
             </p:spPr>
@@ -21901,7 +21429,7 @@
         </p:nvSpPr>
         <p:spPr>
           <a:xfrm>
-            <a:off x="3675355" y="2574524"/>
+            <a:off x="4469556" y="2574524"/>
             <a:ext cx="2024109" cy="276999"/>
           </a:xfrm>
           <a:prstGeom prst="rect">
@@ -21937,7 +21465,7 @@
         </p:nvSpPr>
         <p:spPr>
           <a:xfrm>
-            <a:off x="6096000" y="2574524"/>
+            <a:off x="6789232" y="2574524"/>
             <a:ext cx="2024109" cy="276999"/>
           </a:xfrm>
           <a:prstGeom prst="rect">
@@ -21973,7 +21501,7 @@
         </p:nvSpPr>
         <p:spPr>
           <a:xfrm>
-            <a:off x="8516645" y="2575882"/>
+            <a:off x="8891054" y="2575882"/>
             <a:ext cx="2024109" cy="276999"/>
           </a:xfrm>
           <a:prstGeom prst="rect">
@@ -21995,6 +21523,620 @@
           </a:p>
         </p:txBody>
       </p:sp>
+      <p:sp>
+        <p:nvSpPr>
+          <p:cNvPr id="8" name="TextBox 7">
+            <a:extLst>
+              <a:ext uri="{FF2B5EF4-FFF2-40B4-BE49-F238E27FC236}">
+                <a16:creationId xmlns:a16="http://schemas.microsoft.com/office/drawing/2014/main" id="{F8AF2D6C-44BF-4762-B845-A2912A19704B}"/>
+              </a:ext>
+            </a:extLst>
+          </p:cNvPr>
+          <p:cNvSpPr txBox="1"/>
+          <p:nvPr/>
+        </p:nvSpPr>
+        <p:spPr>
+          <a:xfrm>
+            <a:off x="2445447" y="2573166"/>
+            <a:ext cx="2024109" cy="276999"/>
+          </a:xfrm>
+          <a:prstGeom prst="rect">
+            <a:avLst/>
+          </a:prstGeom>
+          <a:noFill/>
+        </p:spPr>
+        <p:txBody>
+          <a:bodyPr wrap="square" rtlCol="0">
+            <a:spAutoFit/>
+          </a:bodyPr>
+          <a:lstStyle/>
+          <a:p>
+            <a:pPr algn="ctr"/>
+            <a:r>
+              <a:rPr lang="en-SG" sz="1200" dirty="0"/>
+              <a:t>Total Sales</a:t>
+            </a:r>
+          </a:p>
+        </p:txBody>
+      </p:sp>
+      <mc:AlternateContent xmlns:mc="http://schemas.openxmlformats.org/markup-compatibility/2006">
+        <mc:Choice xmlns:a14="http://schemas.microsoft.com/office/drawing/2010/main" Requires="a14">
+          <p:sp>
+            <p:nvSpPr>
+              <p:cNvPr id="10" name="TextBox 9">
+                <a:extLst>
+                  <a:ext uri="{FF2B5EF4-FFF2-40B4-BE49-F238E27FC236}">
+                    <a16:creationId xmlns:a16="http://schemas.microsoft.com/office/drawing/2014/main" id="{E884396B-93FC-3CD0-DF6B-6B7E9C9573AF}"/>
+                  </a:ext>
+                </a:extLst>
+              </p:cNvPr>
+              <p:cNvSpPr txBox="1"/>
+              <p:nvPr/>
+            </p:nvSpPr>
+            <p:spPr>
+              <a:xfrm>
+                <a:off x="6992348" y="3085621"/>
+                <a:ext cx="4945651" cy="3294860"/>
+              </a:xfrm>
+              <a:prstGeom prst="rect">
+                <a:avLst/>
+              </a:prstGeom>
+            </p:spPr>
+            <p:txBody>
+              <a:bodyPr vert="horz" lIns="91440" tIns="45720" rIns="91440" bIns="45720" rtlCol="0" anchor="t">
+                <a:normAutofit lnSpcReduction="10000"/>
+              </a:bodyPr>
+              <a:lstStyle>
+                <a:lvl1pPr marL="342900" lvl="0" indent="-342900">
+                  <a:lnSpc>
+                    <a:spcPct val="107000"/>
+                  </a:lnSpc>
+                  <a:spcBef>
+                    <a:spcPct val="20000"/>
+                  </a:spcBef>
+                  <a:spcAft>
+                    <a:spcPts val="600"/>
+                  </a:spcAft>
+                  <a:buClr>
+                    <a:schemeClr val="accent1">
+                      <a:lumMod val="75000"/>
+                    </a:schemeClr>
+                  </a:buClr>
+                  <a:buSzPct val="145000"/>
+                  <a:buFont typeface="Symbol" panose="05050102010706020507" pitchFamily="18" charset="2"/>
+                  <a:buChar char=""/>
+                  <a:defRPr cap="none">
+                    <a:solidFill>
+                      <a:srgbClr val="000000"/>
+                    </a:solidFill>
+                    <a:effectLst/>
+                    <a:latin typeface="Calibri" panose="020F0502020204030204" pitchFamily="34" charset="0"/>
+                    <a:ea typeface="Calibri" panose="020F0502020204030204" pitchFamily="34" charset="0"/>
+                    <a:cs typeface="Calibri" panose="020F0502020204030204" pitchFamily="34" charset="0"/>
+                  </a:defRPr>
+                </a:lvl1pPr>
+                <a:lvl2pPr indent="0">
+                  <a:spcBef>
+                    <a:spcPct val="20000"/>
+                  </a:spcBef>
+                  <a:spcAft>
+                    <a:spcPts val="600"/>
+                  </a:spcAft>
+                  <a:buClr>
+                    <a:schemeClr val="accent1">
+                      <a:lumMod val="75000"/>
+                    </a:schemeClr>
+                  </a:buClr>
+                  <a:buSzPct val="145000"/>
+                  <a:buFont typeface="Arial"/>
+                  <a:buNone/>
+                  <a:defRPr cap="none">
+                    <a:solidFill>
+                      <a:schemeClr val="tx1">
+                        <a:tint val="75000"/>
+                      </a:schemeClr>
+                    </a:solidFill>
+                    <a:effectLst/>
+                  </a:defRPr>
+                </a:lvl2pPr>
+                <a:lvl3pPr indent="0">
+                  <a:spcBef>
+                    <a:spcPct val="20000"/>
+                  </a:spcBef>
+                  <a:spcAft>
+                    <a:spcPts val="600"/>
+                  </a:spcAft>
+                  <a:buClr>
+                    <a:schemeClr val="accent1">
+                      <a:lumMod val="75000"/>
+                    </a:schemeClr>
+                  </a:buClr>
+                  <a:buSzPct val="145000"/>
+                  <a:buFont typeface="Arial"/>
+                  <a:buNone/>
+                  <a:defRPr sz="1600" cap="none">
+                    <a:solidFill>
+                      <a:schemeClr val="tx1">
+                        <a:tint val="75000"/>
+                      </a:schemeClr>
+                    </a:solidFill>
+                    <a:effectLst/>
+                  </a:defRPr>
+                </a:lvl3pPr>
+                <a:lvl4pPr indent="0">
+                  <a:spcBef>
+                    <a:spcPct val="20000"/>
+                  </a:spcBef>
+                  <a:spcAft>
+                    <a:spcPts val="600"/>
+                  </a:spcAft>
+                  <a:buClr>
+                    <a:schemeClr val="accent1">
+                      <a:lumMod val="75000"/>
+                    </a:schemeClr>
+                  </a:buClr>
+                  <a:buSzPct val="145000"/>
+                  <a:buFont typeface="Arial"/>
+                  <a:buNone/>
+                  <a:defRPr sz="1400" cap="none">
+                    <a:solidFill>
+                      <a:schemeClr val="tx1">
+                        <a:tint val="75000"/>
+                      </a:schemeClr>
+                    </a:solidFill>
+                    <a:effectLst/>
+                  </a:defRPr>
+                </a:lvl4pPr>
+                <a:lvl5pPr indent="0">
+                  <a:spcBef>
+                    <a:spcPct val="20000"/>
+                  </a:spcBef>
+                  <a:spcAft>
+                    <a:spcPts val="600"/>
+                  </a:spcAft>
+                  <a:buClr>
+                    <a:schemeClr val="accent1">
+                      <a:lumMod val="75000"/>
+                    </a:schemeClr>
+                  </a:buClr>
+                  <a:buSzPct val="145000"/>
+                  <a:buFont typeface="Arial"/>
+                  <a:buNone/>
+                  <a:defRPr sz="1400" cap="none">
+                    <a:solidFill>
+                      <a:schemeClr val="tx1">
+                        <a:tint val="75000"/>
+                      </a:schemeClr>
+                    </a:solidFill>
+                    <a:effectLst/>
+                  </a:defRPr>
+                </a:lvl5pPr>
+                <a:lvl6pPr indent="0">
+                  <a:spcBef>
+                    <a:spcPct val="20000"/>
+                  </a:spcBef>
+                  <a:spcAft>
+                    <a:spcPts val="600"/>
+                  </a:spcAft>
+                  <a:buClr>
+                    <a:schemeClr val="accent1">
+                      <a:lumMod val="75000"/>
+                    </a:schemeClr>
+                  </a:buClr>
+                  <a:buSzPct val="145000"/>
+                  <a:buFont typeface="Arial"/>
+                  <a:buNone/>
+                  <a:defRPr sz="1400" cap="none">
+                    <a:solidFill>
+                      <a:schemeClr val="tx1">
+                        <a:tint val="75000"/>
+                      </a:schemeClr>
+                    </a:solidFill>
+                    <a:effectLst/>
+                  </a:defRPr>
+                </a:lvl6pPr>
+                <a:lvl7pPr indent="0">
+                  <a:spcBef>
+                    <a:spcPct val="20000"/>
+                  </a:spcBef>
+                  <a:spcAft>
+                    <a:spcPts val="600"/>
+                  </a:spcAft>
+                  <a:buClr>
+                    <a:schemeClr val="accent1">
+                      <a:lumMod val="75000"/>
+                    </a:schemeClr>
+                  </a:buClr>
+                  <a:buSzPct val="145000"/>
+                  <a:buFont typeface="Arial"/>
+                  <a:buNone/>
+                  <a:defRPr sz="1400" cap="none">
+                    <a:solidFill>
+                      <a:schemeClr val="tx1">
+                        <a:tint val="75000"/>
+                      </a:schemeClr>
+                    </a:solidFill>
+                    <a:effectLst/>
+                  </a:defRPr>
+                </a:lvl7pPr>
+                <a:lvl8pPr indent="0">
+                  <a:spcBef>
+                    <a:spcPct val="20000"/>
+                  </a:spcBef>
+                  <a:spcAft>
+                    <a:spcPts val="600"/>
+                  </a:spcAft>
+                  <a:buClr>
+                    <a:schemeClr val="accent1">
+                      <a:lumMod val="75000"/>
+                    </a:schemeClr>
+                  </a:buClr>
+                  <a:buSzPct val="145000"/>
+                  <a:buFont typeface="Arial"/>
+                  <a:buNone/>
+                  <a:defRPr sz="1400" cap="none">
+                    <a:solidFill>
+                      <a:schemeClr val="tx1">
+                        <a:tint val="75000"/>
+                      </a:schemeClr>
+                    </a:solidFill>
+                    <a:effectLst/>
+                  </a:defRPr>
+                </a:lvl8pPr>
+                <a:lvl9pPr indent="0">
+                  <a:spcBef>
+                    <a:spcPct val="20000"/>
+                  </a:spcBef>
+                  <a:spcAft>
+                    <a:spcPts val="600"/>
+                  </a:spcAft>
+                  <a:buClr>
+                    <a:schemeClr val="accent1">
+                      <a:lumMod val="75000"/>
+                    </a:schemeClr>
+                  </a:buClr>
+                  <a:buSzPct val="145000"/>
+                  <a:buFont typeface="Arial"/>
+                  <a:buNone/>
+                  <a:defRPr sz="1400" cap="none">
+                    <a:solidFill>
+                      <a:schemeClr val="tx1">
+                        <a:tint val="75000"/>
+                      </a:schemeClr>
+                    </a:solidFill>
+                    <a:effectLst/>
+                  </a:defRPr>
+                </a:lvl9pPr>
+              </a:lstStyle>
+              <a:p>
+                <a14:m>
+                  <m:oMath xmlns:m="http://schemas.openxmlformats.org/officeDocument/2006/math">
+                    <m:sSub>
+                      <m:sSubPr>
+                        <m:ctrlPr>
+                          <a:rPr lang="en-SG" sz="1500"/>
+                        </m:ctrlPr>
+                      </m:sSubPr>
+                      <m:e>
+                        <m:r>
+                          <a:rPr lang="en-GB" sz="1500"/>
+                          <m:t>𝑀</m:t>
+                        </m:r>
+                      </m:e>
+                      <m:sub>
+                        <m:r>
+                          <a:rPr lang="en-GB" sz="1500"/>
+                          <m:t>𝑖</m:t>
+                        </m:r>
+                        <m:r>
+                          <a:rPr lang="en-GB" sz="1500"/>
+                          <m:t>,</m:t>
+                        </m:r>
+                        <m:r>
+                          <a:rPr lang="en-GB" sz="1500"/>
+                          <m:t>𝑛</m:t>
+                        </m:r>
+                      </m:sub>
+                    </m:sSub>
+                  </m:oMath>
+                </a14:m>
+                <a:r>
+                  <a:rPr lang="en-GB" sz="1500" dirty="0"/>
+                  <a:t>: Total number of unit outputs produced locally in process n of the local country </a:t>
+                </a:r>
+                <a:r>
+                  <a:rPr lang="en-GB" sz="1500" dirty="0" err="1"/>
+                  <a:t>i</a:t>
+                </a:r>
+                <a:r>
+                  <a:rPr lang="en-GB" sz="1500" dirty="0"/>
+                  <a:t>. (</a:t>
+                </a:r>
+                <a14:m>
+                  <m:oMath xmlns:m="http://schemas.openxmlformats.org/officeDocument/2006/math">
+                    <m:sSub>
+                      <m:sSubPr>
+                        <m:ctrlPr>
+                          <a:rPr lang="en-SG" sz="1500"/>
+                        </m:ctrlPr>
+                      </m:sSubPr>
+                      <m:e>
+                        <m:r>
+                          <a:rPr lang="en-GB" sz="1500"/>
+                          <m:t>𝑀</m:t>
+                        </m:r>
+                      </m:e>
+                      <m:sub>
+                        <m:r>
+                          <a:rPr lang="en-GB" sz="1500"/>
+                          <m:t>𝑖</m:t>
+                        </m:r>
+                        <m:r>
+                          <a:rPr lang="en-GB" sz="1500"/>
+                          <m:t>,</m:t>
+                        </m:r>
+                        <m:r>
+                          <a:rPr lang="en-GB" sz="1500"/>
+                          <m:t>𝐷</m:t>
+                        </m:r>
+                      </m:sub>
+                    </m:sSub>
+                  </m:oMath>
+                </a14:m>
+                <a:r>
+                  <a:rPr lang="en-GB" sz="1500" dirty="0"/>
+                  <a:t> refers to the number of Devices being sold in Distribution.)</a:t>
+                </a:r>
+                <a:endParaRPr lang="en-SG" sz="1500" dirty="0"/>
+              </a:p>
+              <a:p>
+                <a14:m>
+                  <m:oMath xmlns:m="http://schemas.openxmlformats.org/officeDocument/2006/math">
+                    <m:sSub>
+                      <m:sSubPr>
+                        <m:ctrlPr>
+                          <a:rPr lang="en-SG" sz="1500"/>
+                        </m:ctrlPr>
+                      </m:sSubPr>
+                      <m:e>
+                        <m:r>
+                          <a:rPr lang="en-GB" sz="1500"/>
+                          <m:t>𝑇</m:t>
+                        </m:r>
+                      </m:e>
+                      <m:sub>
+                        <m:r>
+                          <a:rPr lang="en-GB" sz="1500"/>
+                          <m:t>𝑜𝑢𝑡</m:t>
+                        </m:r>
+                        <m:r>
+                          <a:rPr lang="en-GB" sz="1500"/>
+                          <m:t>,</m:t>
+                        </m:r>
+                        <m:r>
+                          <a:rPr lang="en-GB" sz="1500"/>
+                          <m:t>𝑖</m:t>
+                        </m:r>
+                        <m:r>
+                          <a:rPr lang="en-GB" sz="1500"/>
+                          <m:t>,</m:t>
+                        </m:r>
+                        <m:r>
+                          <a:rPr lang="en-GB" sz="1500"/>
+                          <m:t>𝑒</m:t>
+                        </m:r>
+                      </m:sub>
+                    </m:sSub>
+                  </m:oMath>
+                </a14:m>
+                <a:r>
+                  <a:rPr lang="en-GB" sz="1500" dirty="0"/>
+                  <a:t>: Total number of units being exported by the local region </a:t>
+                </a:r>
+                <a:r>
+                  <a:rPr lang="en-GB" sz="1500" dirty="0" err="1"/>
+                  <a:t>i</a:t>
+                </a:r>
+                <a:r>
+                  <a:rPr lang="en-GB" sz="1500" dirty="0"/>
+                  <a:t> from process e.</a:t>
+                </a:r>
+                <a:endParaRPr lang="en-SG" sz="1500" dirty="0"/>
+              </a:p>
+              <a:p>
+                <a14:m>
+                  <m:oMath xmlns:m="http://schemas.openxmlformats.org/officeDocument/2006/math">
+                    <m:sSub>
+                      <m:sSubPr>
+                        <m:ctrlPr>
+                          <a:rPr lang="en-SG" sz="1500"/>
+                        </m:ctrlPr>
+                      </m:sSubPr>
+                      <m:e>
+                        <m:r>
+                          <a:rPr lang="en-GB" sz="1500"/>
+                          <m:t>𝑇</m:t>
+                        </m:r>
+                      </m:e>
+                      <m:sub>
+                        <m:r>
+                          <a:rPr lang="en-GB" sz="1500"/>
+                          <m:t>𝑖𝑛</m:t>
+                        </m:r>
+                        <m:r>
+                          <a:rPr lang="en-GB" sz="1500"/>
+                          <m:t>,</m:t>
+                        </m:r>
+                        <m:r>
+                          <a:rPr lang="en-GB" sz="1500"/>
+                          <m:t>𝑑</m:t>
+                        </m:r>
+                        <m:r>
+                          <a:rPr lang="en-GB" sz="1500"/>
+                          <m:t>,</m:t>
+                        </m:r>
+                        <m:r>
+                          <a:rPr lang="en-GB" sz="1500"/>
+                          <m:t>𝑗</m:t>
+                        </m:r>
+                      </m:sub>
+                    </m:sSub>
+                  </m:oMath>
+                </a14:m>
+                <a:r>
+                  <a:rPr lang="en-GB" sz="1500" dirty="0"/>
+                  <a:t>: Total number of units being imported from another region d from process j</a:t>
+                </a:r>
+                <a:endParaRPr lang="en-SG" sz="1500" dirty="0"/>
+              </a:p>
+              <a:p>
+                <a14:m>
+                  <m:oMath xmlns:m="http://schemas.openxmlformats.org/officeDocument/2006/math">
+                    <m:sSub>
+                      <m:sSubPr>
+                        <m:ctrlPr>
+                          <a:rPr lang="en-SG" sz="1500"/>
+                        </m:ctrlPr>
+                      </m:sSubPr>
+                      <m:e>
+                        <m:r>
+                          <a:rPr lang="en-GB" sz="1500"/>
+                          <m:t>𝑟</m:t>
+                        </m:r>
+                      </m:e>
+                      <m:sub>
+                        <m:r>
+                          <a:rPr lang="en-GB" sz="1500"/>
+                          <m:t>𝑜𝑢𝑡</m:t>
+                        </m:r>
+                        <m:r>
+                          <a:rPr lang="en-GB" sz="1500"/>
+                          <m:t>,</m:t>
+                        </m:r>
+                        <m:r>
+                          <a:rPr lang="en-GB" sz="1500"/>
+                          <m:t>𝑖</m:t>
+                        </m:r>
+                        <m:r>
+                          <a:rPr lang="en-GB" sz="1500"/>
+                          <m:t>,</m:t>
+                        </m:r>
+                        <m:r>
+                          <a:rPr lang="en-GB" sz="1500"/>
+                          <m:t>𝑒</m:t>
+                        </m:r>
+                      </m:sub>
+                    </m:sSub>
+                  </m:oMath>
+                </a14:m>
+                <a:r>
+                  <a:rPr lang="en-GB" sz="1500" dirty="0"/>
+                  <a:t>: Revenue for exporting a single of unit of product from process e in country </a:t>
+                </a:r>
+                <a:r>
+                  <a:rPr lang="en-GB" sz="1500" dirty="0" err="1"/>
+                  <a:t>i</a:t>
+                </a:r>
+                <a:r>
+                  <a:rPr lang="en-GB" sz="1500" dirty="0"/>
+                  <a:t>. </a:t>
+                </a:r>
+                <a:endParaRPr lang="en-SG" sz="1500" dirty="0"/>
+              </a:p>
+              <a:p>
+                <a14:m>
+                  <m:oMath xmlns:m="http://schemas.openxmlformats.org/officeDocument/2006/math">
+                    <m:sSub>
+                      <m:sSubPr>
+                        <m:ctrlPr>
+                          <a:rPr lang="en-SG" sz="1500"/>
+                        </m:ctrlPr>
+                      </m:sSubPr>
+                      <m:e>
+                        <m:r>
+                          <a:rPr lang="en-GB" sz="1500"/>
+                          <m:t>𝑟</m:t>
+                        </m:r>
+                      </m:e>
+                      <m:sub>
+                        <m:r>
+                          <a:rPr lang="en-GB" sz="1500"/>
+                          <m:t>𝑖𝑛</m:t>
+                        </m:r>
+                        <m:r>
+                          <a:rPr lang="en-GB" sz="1500"/>
+                          <m:t>,</m:t>
+                        </m:r>
+                        <m:r>
+                          <a:rPr lang="en-GB" sz="1500"/>
+                          <m:t>𝑑</m:t>
+                        </m:r>
+                        <m:r>
+                          <a:rPr lang="en-GB" sz="1500"/>
+                          <m:t>,</m:t>
+                        </m:r>
+                        <m:r>
+                          <a:rPr lang="en-GB" sz="1500"/>
+                          <m:t>𝑗</m:t>
+                        </m:r>
+                      </m:sub>
+                    </m:sSub>
+                  </m:oMath>
+                </a14:m>
+                <a:r>
+                  <a:rPr lang="en-GB" sz="1500" dirty="0"/>
+                  <a:t>: Cost for importing a single of unit of product from process j in region d. </a:t>
+                </a:r>
+                <a:endParaRPr lang="en-SG" sz="1500" dirty="0"/>
+              </a:p>
+            </p:txBody>
+          </p:sp>
+        </mc:Choice>
+        <mc:Fallback>
+          <p:sp>
+            <p:nvSpPr>
+              <p:cNvPr id="10" name="TextBox 9">
+                <a:extLst>
+                  <a:ext uri="{FF2B5EF4-FFF2-40B4-BE49-F238E27FC236}">
+                    <a16:creationId xmlns:a16="http://schemas.microsoft.com/office/drawing/2014/main" id="{E884396B-93FC-3CD0-DF6B-6B7E9C9573AF}"/>
+                  </a:ext>
+                </a:extLst>
+              </p:cNvPr>
+              <p:cNvSpPr txBox="1">
+                <a:spLocks noRot="1" noChangeAspect="1" noMove="1" noResize="1" noEditPoints="1" noAdjustHandles="1" noChangeArrowheads="1" noChangeShapeType="1" noTextEdit="1"/>
+              </p:cNvSpPr>
+              <p:nvPr/>
+            </p:nvSpPr>
+            <p:spPr>
+              <a:xfrm>
+                <a:off x="6992348" y="3085621"/>
+                <a:ext cx="4945651" cy="3294860"/>
+              </a:xfrm>
+              <a:prstGeom prst="rect">
+                <a:avLst/>
+              </a:prstGeom>
+              <a:blipFill>
+                <a:blip r:embed="rId4"/>
+                <a:stretch>
+                  <a:fillRect l="-1603" t="-4251" r="-617"/>
+                </a:stretch>
+              </a:blipFill>
+            </p:spPr>
+            <p:txBody>
+              <a:bodyPr/>
+              <a:lstStyle/>
+              <a:p>
+                <a:r>
+                  <a:rPr lang="en-SG">
+                    <a:noFill/>
+                  </a:rPr>
+                  <a:t> </a:t>
+                </a:r>
+              </a:p>
+            </p:txBody>
+          </p:sp>
+        </mc:Fallback>
+      </mc:AlternateContent>
     </p:spTree>
     <p:extLst>
       <p:ext uri="{BB962C8B-B14F-4D97-AF65-F5344CB8AC3E}">
@@ -22762,6 +22904,26 @@
 </file>
 
 <file path=customXml/item1.xml><?xml version="1.0" encoding="utf-8"?>
+<p:properties xmlns:p="http://schemas.microsoft.com/office/2006/metadata/properties" xmlns:xsi="http://www.w3.org/2001/XMLSchema-instance" xmlns:pc="http://schemas.microsoft.com/office/infopath/2007/PartnerControls">
+  <documentManagement>
+    <TaxCatchAll xmlns="d50ccbe0-cca1-4d4b-b46b-fdd532fd81a5" xsi:nil="true"/>
+    <lcf76f155ced4ddcb4097134ff3c332f xmlns="d36c0395-b650-41ff-912c-e6a462652c6d">
+      <Terms xmlns="http://schemas.microsoft.com/office/infopath/2007/PartnerControls"/>
+    </lcf76f155ced4ddcb4097134ff3c332f>
+  </documentManagement>
+</p:properties>
+</file>
+
+<file path=customXml/item2.xml><?xml version="1.0" encoding="utf-8"?>
+<?mso-contentType ?>
+<FormTemplates xmlns="http://schemas.microsoft.com/sharepoint/v3/contenttype/forms">
+  <Display>DocumentLibraryForm</Display>
+  <Edit>DocumentLibraryForm</Edit>
+  <New>DocumentLibraryForm</New>
+</FormTemplates>
+</file>
+
+<file path=customXml/item3.xml><?xml version="1.0" encoding="utf-8"?>
 <ct:contentTypeSchema xmlns:ct="http://schemas.microsoft.com/office/2006/metadata/contentType" xmlns:ma="http://schemas.microsoft.com/office/2006/metadata/properties/metaAttributes" ct:_="" ma:_="" ma:contentTypeName="Document" ma:contentTypeID="0x010100952BE645A83FA44AAEB7EF4394BE9CE8" ma:contentTypeVersion="10" ma:contentTypeDescription="Create a new document." ma:contentTypeScope="" ma:versionID="0503a23d02e1e8cfccb9d58081f4fa48">
   <xsd:schema xmlns:xsd="http://www.w3.org/2001/XMLSchema" xmlns:xs="http://www.w3.org/2001/XMLSchema" xmlns:p="http://schemas.microsoft.com/office/2006/metadata/properties" xmlns:ns2="d36c0395-b650-41ff-912c-e6a462652c6d" xmlns:ns3="d50ccbe0-cca1-4d4b-b46b-fdd532fd81a5" targetNamespace="http://schemas.microsoft.com/office/2006/metadata/properties" ma:root="true" ma:fieldsID="4ef77329f0aeb8f214345ec4cefe3bf0" ns2:_="" ns3:_="">
     <xsd:import namespace="d36c0395-b650-41ff-912c-e6a462652c6d"/>
@@ -22950,27 +23112,32 @@
 </ct:contentTypeSchema>
 </file>
 
-<file path=customXml/item2.xml><?xml version="1.0" encoding="utf-8"?>
-<?mso-contentType ?>
-<FormTemplates xmlns="http://schemas.microsoft.com/sharepoint/v3/contenttype/forms">
-  <Display>DocumentLibraryForm</Display>
-  <Edit>DocumentLibraryForm</Edit>
-  <New>DocumentLibraryForm</New>
-</FormTemplates>
+<file path=customXml/itemProps1.xml><?xml version="1.0" encoding="utf-8"?>
+<ds:datastoreItem xmlns:ds="http://schemas.openxmlformats.org/officeDocument/2006/customXml" ds:itemID="{A3A737A3-78E3-4DC8-898D-CCE433D32979}">
+  <ds:schemaRefs>
+    <ds:schemaRef ds:uri="http://purl.org/dc/elements/1.1/"/>
+    <ds:schemaRef ds:uri="http://schemas.microsoft.com/office/2006/documentManagement/types"/>
+    <ds:schemaRef ds:uri="http://purl.org/dc/terms/"/>
+    <ds:schemaRef ds:uri="d36c0395-b650-41ff-912c-e6a462652c6d"/>
+    <ds:schemaRef ds:uri="http://www.w3.org/XML/1998/namespace"/>
+    <ds:schemaRef ds:uri="http://purl.org/dc/dcmitype/"/>
+    <ds:schemaRef ds:uri="http://schemas.openxmlformats.org/package/2006/metadata/core-properties"/>
+    <ds:schemaRef ds:uri="http://schemas.microsoft.com/office/infopath/2007/PartnerControls"/>
+    <ds:schemaRef ds:uri="d50ccbe0-cca1-4d4b-b46b-fdd532fd81a5"/>
+    <ds:schemaRef ds:uri="http://schemas.microsoft.com/office/2006/metadata/properties"/>
+  </ds:schemaRefs>
+</ds:datastoreItem>
 </file>
 
-<file path=customXml/item3.xml><?xml version="1.0" encoding="utf-8"?>
-<p:properties xmlns:p="http://schemas.microsoft.com/office/2006/metadata/properties" xmlns:xsi="http://www.w3.org/2001/XMLSchema-instance" xmlns:pc="http://schemas.microsoft.com/office/infopath/2007/PartnerControls">
-  <documentManagement>
-    <TaxCatchAll xmlns="d50ccbe0-cca1-4d4b-b46b-fdd532fd81a5" xsi:nil="true"/>
-    <lcf76f155ced4ddcb4097134ff3c332f xmlns="d36c0395-b650-41ff-912c-e6a462652c6d">
-      <Terms xmlns="http://schemas.microsoft.com/office/infopath/2007/PartnerControls"/>
-    </lcf76f155ced4ddcb4097134ff3c332f>
-  </documentManagement>
-</p:properties>
+<file path=customXml/itemProps2.xml><?xml version="1.0" encoding="utf-8"?>
+<ds:datastoreItem xmlns:ds="http://schemas.openxmlformats.org/officeDocument/2006/customXml" ds:itemID="{8FF60034-A11D-4F90-A489-89BB9DC94BDB}">
+  <ds:schemaRefs>
+    <ds:schemaRef ds:uri="http://schemas.microsoft.com/sharepoint/v3/contenttype/forms"/>
+  </ds:schemaRefs>
+</ds:datastoreItem>
 </file>
 
-<file path=customXml/itemProps1.xml><?xml version="1.0" encoding="utf-8"?>
+<file path=customXml/itemProps3.xml><?xml version="1.0" encoding="utf-8"?>
 <ds:datastoreItem xmlns:ds="http://schemas.openxmlformats.org/officeDocument/2006/customXml" ds:itemID="{C570983F-5195-44B7-92D0-B0EE195BE993}">
   <ds:schemaRefs>
     <ds:schemaRef ds:uri="http://schemas.microsoft.com/office/2006/metadata/contentType"/>
@@ -22987,29 +23154,4 @@
     <ds:schemaRef ds:uri="http://schemas.microsoft.com/internal/obd"/>
   </ds:schemaRefs>
 </ds:datastoreItem>
-</file>
-
-<file path=customXml/itemProps2.xml><?xml version="1.0" encoding="utf-8"?>
-<ds:datastoreItem xmlns:ds="http://schemas.openxmlformats.org/officeDocument/2006/customXml" ds:itemID="{8FF60034-A11D-4F90-A489-89BB9DC94BDB}">
-  <ds:schemaRefs>
-    <ds:schemaRef ds:uri="http://schemas.microsoft.com/sharepoint/v3/contenttype/forms"/>
-  </ds:schemaRefs>
-</ds:datastoreItem>
-</file>
-
-<file path=customXml/itemProps3.xml><?xml version="1.0" encoding="utf-8"?>
-<ds:datastoreItem xmlns:ds="http://schemas.openxmlformats.org/officeDocument/2006/customXml" ds:itemID="{A3A737A3-78E3-4DC8-898D-CCE433D32979}">
-  <ds:schemaRefs>
-    <ds:schemaRef ds:uri="http://purl.org/dc/elements/1.1/"/>
-    <ds:schemaRef ds:uri="http://schemas.microsoft.com/office/2006/documentManagement/types"/>
-    <ds:schemaRef ds:uri="http://purl.org/dc/terms/"/>
-    <ds:schemaRef ds:uri="d36c0395-b650-41ff-912c-e6a462652c6d"/>
-    <ds:schemaRef ds:uri="http://www.w3.org/XML/1998/namespace"/>
-    <ds:schemaRef ds:uri="http://purl.org/dc/dcmitype/"/>
-    <ds:schemaRef ds:uri="http://schemas.openxmlformats.org/package/2006/metadata/core-properties"/>
-    <ds:schemaRef ds:uri="http://schemas.microsoft.com/office/infopath/2007/PartnerControls"/>
-    <ds:schemaRef ds:uri="d50ccbe0-cca1-4d4b-b46b-fdd532fd81a5"/>
-    <ds:schemaRef ds:uri="http://schemas.microsoft.com/office/2006/metadata/properties"/>
-  </ds:schemaRefs>
-</ds:datastoreItem>
 </file>
</xml_diff>